<commit_message>
Presentation: Pretty structure, passable pictures.
</commit_message>
<xml_diff>
--- a/pssif/doc/PSSIF.pptx
+++ b/pssif/doc/PSSIF.pptx
@@ -5,10 +5,10 @@
     <p:sldMasterId id="2147483837" r:id="rId1"/>
   </p:sldMasterIdLst>
   <p:notesMasterIdLst>
-    <p:notesMasterId r:id="rId42"/>
+    <p:notesMasterId r:id="rId40"/>
   </p:notesMasterIdLst>
   <p:handoutMasterIdLst>
-    <p:handoutMasterId r:id="rId43"/>
+    <p:handoutMasterId r:id="rId41"/>
   </p:handoutMasterIdLst>
   <p:sldIdLst>
     <p:sldId id="256" r:id="rId2"/>
@@ -17,16 +17,16 @@
     <p:sldId id="273" r:id="rId5"/>
     <p:sldId id="258" r:id="rId6"/>
     <p:sldId id="274" r:id="rId7"/>
-    <p:sldId id="259" r:id="rId8"/>
-    <p:sldId id="260" r:id="rId9"/>
-    <p:sldId id="261" r:id="rId10"/>
-    <p:sldId id="287" r:id="rId11"/>
-    <p:sldId id="288" r:id="rId12"/>
-    <p:sldId id="289" r:id="rId13"/>
-    <p:sldId id="290" r:id="rId14"/>
-    <p:sldId id="262" r:id="rId15"/>
-    <p:sldId id="263" r:id="rId16"/>
-    <p:sldId id="291" r:id="rId17"/>
+    <p:sldId id="260" r:id="rId8"/>
+    <p:sldId id="261" r:id="rId9"/>
+    <p:sldId id="287" r:id="rId10"/>
+    <p:sldId id="288" r:id="rId11"/>
+    <p:sldId id="289" r:id="rId12"/>
+    <p:sldId id="290" r:id="rId13"/>
+    <p:sldId id="262" r:id="rId14"/>
+    <p:sldId id="263" r:id="rId15"/>
+    <p:sldId id="291" r:id="rId16"/>
+    <p:sldId id="297" r:id="rId17"/>
     <p:sldId id="292" r:id="rId18"/>
     <p:sldId id="293" r:id="rId19"/>
     <p:sldId id="296" r:id="rId20"/>
@@ -47,15 +47,13 @@
     <p:sldId id="276" r:id="rId35"/>
     <p:sldId id="265" r:id="rId36"/>
     <p:sldId id="286" r:id="rId37"/>
-    <p:sldId id="266" r:id="rId38"/>
-    <p:sldId id="268" r:id="rId39"/>
-    <p:sldId id="285" r:id="rId40"/>
-    <p:sldId id="267" r:id="rId41"/>
+    <p:sldId id="285" r:id="rId38"/>
+    <p:sldId id="267" r:id="rId39"/>
   </p:sldIdLst>
   <p:sldSz cx="9144000" cy="6858000" type="screen4x3"/>
   <p:notesSz cx="6797675" cy="9926638"/>
   <p:custDataLst>
-    <p:tags r:id="rId44"/>
+    <p:tags r:id="rId42"/>
   </p:custDataLst>
   <p:defaultTextStyle>
     <a:defPPr>
@@ -184,7 +182,7 @@
   </p:defaultTextStyle>
   <p:extLst>
     <p:ext uri="{EFAFB233-063F-42B5-8137-9DF3F51BA10A}">
-      <p15:sldGuideLst xmlns:p15="http://schemas.microsoft.com/office/powerpoint/2012/main" xmlns="">
+      <p15:sldGuideLst xmlns="" xmlns:p15="http://schemas.microsoft.com/office/powerpoint/2012/main">
         <p15:guide id="1" orient="horz" pos="3612">
           <p15:clr>
             <a:srgbClr val="A4A3A4"/>
@@ -258,7 +256,7 @@
       </p15:sldGuideLst>
     </p:ext>
     <p:ext uri="{2D200454-40CA-4A62-9FC3-DE9A4176ACB9}">
-      <p15:notesGuideLst xmlns:p15="http://schemas.microsoft.com/office/powerpoint/2012/main" xmlns="">
+      <p15:notesGuideLst xmlns="" xmlns:p15="http://schemas.microsoft.com/office/powerpoint/2012/main">
         <p15:guide id="1" orient="horz" pos="3128">
           <p15:clr>
             <a:srgbClr val="A4A3A4"/>
@@ -277,7 +275,7 @@
 
 <file path=ppt/commentAuthors.xml><?xml version="1.0" encoding="utf-8"?>
 <p:cmAuthorLst xmlns:a="http://schemas.openxmlformats.org/drawingml/2006/main" xmlns:r="http://schemas.openxmlformats.org/officeDocument/2006/relationships" xmlns:p="http://schemas.openxmlformats.org/presentationml/2006/main">
-  <p:cmAuthor id="2" name="Autor" initials="A" lastIdx="0" clrIdx="2"/>
+  <p:cmAuthor id="3" name="Author" initials="A" lastIdx="0" clrIdx="3"/>
 </p:cmAuthorLst>
 </file>
 
@@ -495,7 +493,7 @@
               <a:pPr>
                 <a:defRPr/>
               </a:pPr>
-              <a:t>‹Nr.›</a:t>
+              <a:t>‹#›</a:t>
             </a:fld>
             <a:endParaRPr lang="de-DE"/>
           </a:p>
@@ -504,7 +502,7 @@
     </p:spTree>
     <p:extLst>
       <p:ext uri="{BB962C8B-B14F-4D97-AF65-F5344CB8AC3E}">
-        <p14:creationId xmlns:p14="http://schemas.microsoft.com/office/powerpoint/2010/main" xmlns="" val="164483809"/>
+        <p14:creationId xmlns="" xmlns:p14="http://schemas.microsoft.com/office/powerpoint/2010/main" val="164483809"/>
       </p:ext>
     </p:extLst>
   </p:cSld>
@@ -837,7 +835,7 @@
               <a:pPr>
                 <a:defRPr/>
               </a:pPr>
-              <a:t>‹Nr.›</a:t>
+              <a:t>‹#›</a:t>
             </a:fld>
             <a:endParaRPr lang="de-DE"/>
           </a:p>
@@ -846,7 +844,7 @@
     </p:spTree>
     <p:extLst>
       <p:ext uri="{BB962C8B-B14F-4D97-AF65-F5344CB8AC3E}">
-        <p14:creationId xmlns:p14="http://schemas.microsoft.com/office/powerpoint/2010/main" xmlns="" val="220946427"/>
+        <p14:creationId xmlns="" xmlns:p14="http://schemas.microsoft.com/office/powerpoint/2010/main" val="220946427"/>
       </p:ext>
     </p:extLst>
   </p:cSld>
@@ -1279,7 +1277,7 @@
           <a:blip r:embed="rId3" cstate="print">
             <a:extLst>
               <a:ext uri="{28A0092B-C50C-407E-A947-70E740481C1C}">
-                <a14:useLocalDpi xmlns:a14="http://schemas.microsoft.com/office/drawing/2010/main" xmlns="" val="0"/>
+                <a14:useLocalDpi xmlns="" xmlns:a14="http://schemas.microsoft.com/office/drawing/2010/main" val="0"/>
               </a:ext>
             </a:extLst>
           </a:blip>
@@ -1309,7 +1307,7 @@
           <a:blip r:embed="rId4" cstate="print">
             <a:extLst>
               <a:ext uri="{28A0092B-C50C-407E-A947-70E740481C1C}">
-                <a14:useLocalDpi xmlns:a14="http://schemas.microsoft.com/office/drawing/2010/main" xmlns="" val="0"/>
+                <a14:useLocalDpi xmlns="" xmlns:a14="http://schemas.microsoft.com/office/drawing/2010/main" val="0"/>
               </a:ext>
             </a:extLst>
           </a:blip>
@@ -1339,7 +1337,7 @@
           <a:blip r:embed="rId5" cstate="print">
             <a:extLst>
               <a:ext uri="{28A0092B-C50C-407E-A947-70E740481C1C}">
-                <a14:useLocalDpi xmlns:a14="http://schemas.microsoft.com/office/drawing/2010/main" xmlns="" val="0"/>
+                <a14:useLocalDpi xmlns="" xmlns:a14="http://schemas.microsoft.com/office/drawing/2010/main" val="0"/>
               </a:ext>
             </a:extLst>
           </a:blip>
@@ -1495,7 +1493,7 @@
                 </a:spcAft>
                 <a:defRPr/>
               </a:pPr>
-              <a:t>‹Nr.›</a:t>
+              <a:t>‹#›</a:t>
             </a:fld>
             <a:endParaRPr lang="de-DE" sz="800" kern="0" dirty="0">
               <a:solidFill>
@@ -1634,7 +1632,7 @@
           <a:blip r:embed="rId2" cstate="print">
             <a:extLst>
               <a:ext uri="{28A0092B-C50C-407E-A947-70E740481C1C}">
-                <a14:useLocalDpi xmlns:a14="http://schemas.microsoft.com/office/drawing/2010/main" xmlns="" val="0"/>
+                <a14:useLocalDpi xmlns="" xmlns:a14="http://schemas.microsoft.com/office/drawing/2010/main" val="0"/>
               </a:ext>
             </a:extLst>
           </a:blip>
@@ -1664,7 +1662,7 @@
           <a:blip r:embed="rId3" cstate="print">
             <a:extLst>
               <a:ext uri="{28A0092B-C50C-407E-A947-70E740481C1C}">
-                <a14:useLocalDpi xmlns:a14="http://schemas.microsoft.com/office/drawing/2010/main" xmlns="" val="0"/>
+                <a14:useLocalDpi xmlns="" xmlns:a14="http://schemas.microsoft.com/office/drawing/2010/main" val="0"/>
               </a:ext>
             </a:extLst>
           </a:blip>
@@ -1694,7 +1692,7 @@
           <a:blip r:embed="rId4" cstate="print">
             <a:extLst>
               <a:ext uri="{28A0092B-C50C-407E-A947-70E740481C1C}">
-                <a14:useLocalDpi xmlns:a14="http://schemas.microsoft.com/office/drawing/2010/main" xmlns="" val="0"/>
+                <a14:useLocalDpi xmlns="" xmlns:a14="http://schemas.microsoft.com/office/drawing/2010/main" val="0"/>
               </a:ext>
             </a:extLst>
           </a:blip>
@@ -2280,33 +2278,37 @@
             <p:ph type="body" sz="quarter" idx="10"/>
           </p:nvPr>
         </p:nvSpPr>
-        <p:spPr/>
+        <p:spPr>
+          <a:xfrm>
+            <a:off x="250824" y="933450"/>
+            <a:ext cx="8321704" cy="4495813"/>
+          </a:xfrm>
+        </p:spPr>
         <p:txBody>
           <a:bodyPr/>
           <a:lstStyle/>
           <a:p>
             <a:r>
               <a:rPr lang="de-DE" dirty="0" smtClean="0"/>
-              <a:t>Direkte Überführung eines Modells in der Quellsprache A zu einem Modell in der Zielsprache B</a:t>
-            </a:r>
-          </a:p>
-          <a:p>
-            <a:r>
-              <a:rPr lang="de-DE" dirty="0" smtClean="0"/>
-              <a:t>Auf Ebene der konkreten Syntax der jeweiligen Sprachen</a:t>
-            </a:r>
-          </a:p>
-          <a:p>
-            <a:r>
-              <a:rPr lang="de-DE" dirty="0" smtClean="0"/>
-              <a:t>Sehr konkret – keine Abstraktion</a:t>
-            </a:r>
-          </a:p>
-          <a:p>
-            <a:r>
-              <a:rPr lang="de-DE" dirty="0" smtClean="0"/>
-              <a:t>Beispiel: XSLT bei XML-basierten Serializierung</a:t>
-            </a:r>
+              <a:t>Direkte Überführung von Quellsprache A nach Zielsprache B über eigenes abstraktes </a:t>
+            </a:r>
+            <a:r>
+              <a:rPr lang="de-DE" dirty="0" smtClean="0"/>
+              <a:t>Datenmodell</a:t>
+            </a:r>
+          </a:p>
+          <a:p>
+            <a:r>
+              <a:rPr lang="de-DE" dirty="0" smtClean="0"/>
+              <a:t>Vorteil: Abstraktion des konkreten Syntax</a:t>
+            </a:r>
+          </a:p>
+          <a:p>
+            <a:r>
+              <a:rPr lang="de-DE" dirty="0" smtClean="0"/>
+              <a:t>Nachteil: Aufwand steigt exponentiell in der Anzahl an Sprachen</a:t>
+            </a:r>
+            <a:endParaRPr lang="de-DE" dirty="0" smtClean="0"/>
           </a:p>
         </p:txBody>
       </p:sp>
@@ -2320,34 +2322,62 @@
             <p:ph type="title"/>
           </p:nvPr>
         </p:nvSpPr>
-        <p:spPr/>
+        <p:spPr>
+          <a:xfrm>
+            <a:off x="250825" y="195526"/>
+            <a:ext cx="8031163" cy="600164"/>
+          </a:xfrm>
+        </p:spPr>
         <p:txBody>
           <a:bodyPr/>
           <a:lstStyle/>
           <a:p>
             <a:r>
               <a:rPr lang="de-DE" dirty="0" smtClean="0"/>
-              <a:t>Direkte syntax-abhängigte Transformation </a:t>
-            </a:r>
-            <a:endParaRPr lang="bg-BG" dirty="0"/>
+              <a:t>Transformationen</a:t>
+            </a:r>
+            <a:r>
+              <a:rPr lang="de-DE" dirty="0" smtClean="0"/>
+              <a:t> (IDP 1) </a:t>
+            </a:r>
+            <a:r>
+              <a:rPr lang="de-DE" dirty="0" smtClean="0"/>
+              <a:t>– </a:t>
+            </a:r>
+            <a:r>
+              <a:rPr lang="de-DE" dirty="0" smtClean="0"/>
+              <a:t>Lösungsmöglichkeit 2</a:t>
+            </a:r>
+            <a:br>
+              <a:rPr lang="de-DE" dirty="0" smtClean="0"/>
+            </a:br>
+            <a:r>
+              <a:rPr lang="de-DE" sz="1400" dirty="0" smtClean="0"/>
+              <a:t>Direkte </a:t>
+            </a:r>
+            <a:r>
+              <a:rPr lang="de-DE" sz="1400" dirty="0" smtClean="0"/>
+              <a:t>syntax-unabhängigte Transformation</a:t>
+            </a:r>
+            <a:endParaRPr lang="bg-BG" sz="1400" dirty="0"/>
           </a:p>
         </p:txBody>
       </p:sp>
       <p:graphicFrame>
         <p:nvGraphicFramePr>
-          <p:cNvPr id="4098" name="Object 2"/>
+          <p:cNvPr id="25601" name="Object 1"/>
           <p:cNvGraphicFramePr>
             <a:graphicFrameLocks noChangeAspect="1"/>
           </p:cNvGraphicFramePr>
           <p:nvPr/>
         </p:nvGraphicFramePr>
         <p:xfrm>
-          <a:off x="1428728" y="3214686"/>
-          <a:ext cx="6143625" cy="2533650"/>
+          <a:off x="642909" y="2428868"/>
+          <a:ext cx="7772407" cy="3429003"/>
         </p:xfrm>
         <a:graphic>
           <a:graphicData uri="http://schemas.openxmlformats.org/presentationml/2006/ole">
-            <p:oleObj spid="_x0000_s4100" name="Visio" r:id="rId3" imgW="6143635" imgH="2533560" progId="Visio.Drawing.15">
+            <p:oleObj spid="_x0000_s25601" name="Visio" r:id="rId3" imgW="6800715" imgH="3000375" progId="Visio.Drawing.15">
               <p:embed/>
             </p:oleObj>
           </a:graphicData>
@@ -2388,27 +2418,52 @@
             <p:ph type="body" sz="quarter" idx="10"/>
           </p:nvPr>
         </p:nvSpPr>
-        <p:spPr/>
+        <p:spPr>
+          <a:xfrm>
+            <a:off x="250824" y="933450"/>
+            <a:ext cx="8321704" cy="4495813"/>
+          </a:xfrm>
+        </p:spPr>
         <p:txBody>
           <a:bodyPr/>
           <a:lstStyle/>
           <a:p>
             <a:r>
               <a:rPr lang="de-DE" dirty="0" smtClean="0"/>
-              <a:t>Direkte Überführung von Quellsprache A nach Zielsprache B über eigenes abstraktes Datenmodell</a:t>
-            </a:r>
-          </a:p>
-          <a:p>
-            <a:r>
-              <a:rPr lang="de-DE" dirty="0" smtClean="0"/>
-              <a:t>Auf Ebene der abstrakten Syntax der jeweiligen Sprachen</a:t>
-            </a:r>
-          </a:p>
-          <a:p>
-            <a:r>
-              <a:rPr lang="de-DE" dirty="0" smtClean="0"/>
-              <a:t>Abstraktion von der konkreten Syntax</a:t>
-            </a:r>
+              <a:t>Transformation von der Quellsprache in ein eigenes fixes Schema</a:t>
+            </a:r>
+          </a:p>
+          <a:p>
+            <a:r>
+              <a:rPr lang="de-DE" dirty="0" smtClean="0"/>
+              <a:t>Darauf folgende Transformation von den eigenen Schema in der Zielsprache</a:t>
+            </a:r>
+          </a:p>
+          <a:p>
+            <a:r>
+              <a:rPr lang="de-DE" dirty="0" smtClean="0"/>
+              <a:t>Vorteil: Abstraktion </a:t>
+            </a:r>
+            <a:r>
+              <a:rPr lang="de-DE" dirty="0" smtClean="0"/>
+              <a:t>von </a:t>
+            </a:r>
+            <a:r>
+              <a:rPr lang="de-DE" dirty="0" smtClean="0"/>
+              <a:t>der Syntax der Sprachen</a:t>
+            </a:r>
+            <a:r>
+              <a:rPr lang="de-DE" dirty="0" smtClean="0"/>
+              <a:t>, geringer Aufwand für neue Sprache</a:t>
+            </a:r>
+            <a:endParaRPr lang="de-DE" dirty="0" smtClean="0"/>
+          </a:p>
+          <a:p>
+            <a:r>
+              <a:rPr lang="de-DE" dirty="0" smtClean="0"/>
+              <a:t>Nachteil: Großer Aufwand bei Änderung am Zwischenschema</a:t>
+            </a:r>
+            <a:endParaRPr lang="de-DE" dirty="0" smtClean="0"/>
           </a:p>
         </p:txBody>
       </p:sp>
@@ -2422,19 +2477,67 @@
             <p:ph type="title"/>
           </p:nvPr>
         </p:nvSpPr>
-        <p:spPr/>
+        <p:spPr>
+          <a:xfrm>
+            <a:off x="250825" y="195526"/>
+            <a:ext cx="8031163" cy="600164"/>
+          </a:xfrm>
+        </p:spPr>
         <p:txBody>
           <a:bodyPr/>
           <a:lstStyle/>
           <a:p>
             <a:r>
               <a:rPr lang="de-DE" dirty="0" smtClean="0"/>
-              <a:t>Direkte syntax-unabhängigte Transformation</a:t>
-            </a:r>
-            <a:endParaRPr lang="bg-BG" dirty="0"/>
+              <a:t>Transformationen</a:t>
+            </a:r>
+            <a:r>
+              <a:rPr lang="de-DE" dirty="0" smtClean="0"/>
+              <a:t> (IDP 1) </a:t>
+            </a:r>
+            <a:r>
+              <a:rPr lang="de-DE" dirty="0" smtClean="0"/>
+              <a:t>– </a:t>
+            </a:r>
+            <a:r>
+              <a:rPr lang="de-DE" dirty="0" smtClean="0"/>
+              <a:t>Lösungsmöglichkeit 3</a:t>
+            </a:r>
+            <a:br>
+              <a:rPr lang="de-DE" dirty="0" smtClean="0"/>
+            </a:br>
+            <a:r>
+              <a:rPr lang="de-DE" sz="1400" dirty="0" smtClean="0"/>
+              <a:t>Indirekte </a:t>
+            </a:r>
+            <a:r>
+              <a:rPr lang="de-DE" sz="1400" dirty="0" smtClean="0"/>
+              <a:t>Transformation mit fixem Schema</a:t>
+            </a:r>
+            <a:endParaRPr lang="bg-BG" sz="1400" dirty="0"/>
           </a:p>
         </p:txBody>
       </p:sp>
+      <p:graphicFrame>
+        <p:nvGraphicFramePr>
+          <p:cNvPr id="24577" name="Object 1"/>
+          <p:cNvGraphicFramePr>
+            <a:graphicFrameLocks noChangeAspect="1"/>
+          </p:cNvGraphicFramePr>
+          <p:nvPr/>
+        </p:nvGraphicFramePr>
+        <p:xfrm>
+          <a:off x="857224" y="2571744"/>
+          <a:ext cx="7286676" cy="3286148"/>
+        </p:xfrm>
+        <a:graphic>
+          <a:graphicData uri="http://schemas.openxmlformats.org/presentationml/2006/ole">
+            <p:oleObj spid="_x0000_s24577" name="Visio" r:id="rId3" imgW="6800715" imgH="3067140" progId="Visio.Drawing.15">
+              <p:embed/>
+            </p:oleObj>
+          </a:graphicData>
+        </a:graphic>
+      </p:graphicFrame>
     </p:spTree>
   </p:cSld>
   <p:clrMapOvr>
@@ -2470,47 +2573,39 @@
             <p:ph type="body" sz="quarter" idx="10"/>
           </p:nvPr>
         </p:nvSpPr>
-        <p:spPr/>
+        <p:spPr>
+          <a:xfrm>
+            <a:off x="250824" y="933450"/>
+            <a:ext cx="8321704" cy="4495813"/>
+          </a:xfrm>
+        </p:spPr>
         <p:txBody>
           <a:bodyPr/>
           <a:lstStyle/>
           <a:p>
             <a:r>
               <a:rPr lang="de-DE" dirty="0" smtClean="0"/>
-              <a:t>Transformation von der Quellsprache in ein eigenes fixes Schema</a:t>
-            </a:r>
-          </a:p>
-          <a:p>
-            <a:r>
-              <a:rPr lang="de-DE" dirty="0" smtClean="0"/>
-              <a:t>Darauf folgende Transformation von den eigenen Schema in der Zielsprache</a:t>
-            </a:r>
-          </a:p>
-          <a:p>
-            <a:r>
-              <a:rPr lang="de-DE" dirty="0" smtClean="0"/>
-              <a:t>Durch das eigene Schema:</a:t>
-            </a:r>
-          </a:p>
-          <a:p>
-            <a:pPr lvl="1"/>
-            <a:r>
-              <a:rPr lang="de-DE" dirty="0" smtClean="0"/>
-              <a:t>Abstraktion von der konkreten Syntax</a:t>
-            </a:r>
-          </a:p>
-          <a:p>
-            <a:pPr lvl="1"/>
-            <a:r>
-              <a:rPr lang="de-DE" dirty="0" smtClean="0"/>
-              <a:t>Abstration von der abstrakten Syntax</a:t>
-            </a:r>
-          </a:p>
-          <a:p>
-            <a:r>
-              <a:rPr lang="de-DE" dirty="0" smtClean="0"/>
-              <a:t>Fest-ausimplementierte Transformationsregeln</a:t>
-            </a:r>
+              <a:t>Transformation über Zwischenformat, definiert über ein flexibles Schema</a:t>
+            </a:r>
+          </a:p>
+          <a:p>
+            <a:r>
+              <a:rPr lang="de-DE" dirty="0" smtClean="0"/>
+              <a:t>Vorteil: Änderungen durch Konfiguration</a:t>
+            </a:r>
+          </a:p>
+          <a:p>
+            <a:r>
+              <a:rPr lang="de-DE" dirty="0" smtClean="0"/>
+              <a:t>Nachteil: Größerer initialer Aufwand für die Umsetzung</a:t>
+            </a:r>
+          </a:p>
+          <a:p>
+            <a:r>
+              <a:rPr lang="de-DE" dirty="0" smtClean="0"/>
+              <a:t>Beispiel: EMF</a:t>
+            </a:r>
+            <a:endParaRPr lang="de-DE" dirty="0" smtClean="0"/>
           </a:p>
         </p:txBody>
       </p:sp>
@@ -2524,19 +2619,67 @@
             <p:ph type="title"/>
           </p:nvPr>
         </p:nvSpPr>
-        <p:spPr/>
+        <p:spPr>
+          <a:xfrm>
+            <a:off x="250825" y="195526"/>
+            <a:ext cx="8031163" cy="600164"/>
+          </a:xfrm>
+        </p:spPr>
         <p:txBody>
           <a:bodyPr/>
           <a:lstStyle/>
           <a:p>
             <a:r>
               <a:rPr lang="de-DE" dirty="0" smtClean="0"/>
-              <a:t>Indirekte Transformation mit fixem Schema</a:t>
-            </a:r>
-            <a:endParaRPr lang="bg-BG" dirty="0"/>
+              <a:t>Transformationen </a:t>
+            </a:r>
+            <a:r>
+              <a:rPr lang="de-DE" dirty="0" smtClean="0"/>
+              <a:t> (IDP 1) </a:t>
+            </a:r>
+            <a:r>
+              <a:rPr lang="de-DE" dirty="0" smtClean="0"/>
+              <a:t>– </a:t>
+            </a:r>
+            <a:r>
+              <a:rPr lang="de-DE" dirty="0" smtClean="0"/>
+              <a:t>Lösungsmöglichkeit 4</a:t>
+            </a:r>
+            <a:br>
+              <a:rPr lang="de-DE" dirty="0" smtClean="0"/>
+            </a:br>
+            <a:r>
+              <a:rPr lang="de-DE" sz="1400" dirty="0" smtClean="0"/>
+              <a:t>Indirekte </a:t>
+            </a:r>
+            <a:r>
+              <a:rPr lang="de-DE" sz="1400" dirty="0" smtClean="0"/>
+              <a:t>Transformation mit variablem Schema</a:t>
+            </a:r>
+            <a:endParaRPr lang="bg-BG" sz="1400" dirty="0"/>
           </a:p>
         </p:txBody>
       </p:sp>
+      <p:graphicFrame>
+        <p:nvGraphicFramePr>
+          <p:cNvPr id="23553" name="Object 1"/>
+          <p:cNvGraphicFramePr>
+            <a:graphicFrameLocks noChangeAspect="1"/>
+          </p:cNvGraphicFramePr>
+          <p:nvPr/>
+        </p:nvGraphicFramePr>
+        <p:xfrm>
+          <a:off x="500034" y="2857496"/>
+          <a:ext cx="8166314" cy="2500330"/>
+        </p:xfrm>
+        <a:graphic>
+          <a:graphicData uri="http://schemas.openxmlformats.org/presentationml/2006/ole">
+            <p:oleObj spid="_x0000_s23553" name="Visio" r:id="rId3" imgW="7248393" imgH="2219196" progId="Visio.Drawing.15">
+              <p:embed/>
+            </p:oleObj>
+          </a:graphicData>
+        </a:graphic>
+      </p:graphicFrame>
     </p:spTree>
   </p:cSld>
   <p:clrMapOvr>
@@ -2546,103 +2689,6 @@
 </file>
 
 <file path=ppt/slides/slide13.xml><?xml version="1.0" encoding="utf-8"?>
-<p:sld xmlns:a="http://schemas.openxmlformats.org/drawingml/2006/main" xmlns:r="http://schemas.openxmlformats.org/officeDocument/2006/relationships" xmlns:p="http://schemas.openxmlformats.org/presentationml/2006/main">
-  <p:cSld>
-    <p:spTree>
-      <p:nvGrpSpPr>
-        <p:cNvPr id="1" name=""/>
-        <p:cNvGrpSpPr/>
-        <p:nvPr/>
-      </p:nvGrpSpPr>
-      <p:grpSpPr>
-        <a:xfrm>
-          <a:off x="0" y="0"/>
-          <a:ext cx="0" cy="0"/>
-          <a:chOff x="0" y="0"/>
-          <a:chExt cx="0" cy="0"/>
-        </a:xfrm>
-      </p:grpSpPr>
-      <p:sp>
-        <p:nvSpPr>
-          <p:cNvPr id="2" name="Text Placeholder 1"/>
-          <p:cNvSpPr>
-            <a:spLocks noGrp="1"/>
-          </p:cNvSpPr>
-          <p:nvPr>
-            <p:ph type="body" sz="quarter" idx="10"/>
-          </p:nvPr>
-        </p:nvSpPr>
-        <p:spPr/>
-        <p:txBody>
-          <a:bodyPr/>
-          <a:lstStyle/>
-          <a:p>
-            <a:r>
-              <a:rPr lang="de-DE" dirty="0" smtClean="0"/>
-              <a:t>Transformation über Zwischenformat, definiert über ein flexibles Schema</a:t>
-            </a:r>
-          </a:p>
-          <a:p>
-            <a:r>
-              <a:rPr lang="de-DE" dirty="0" smtClean="0"/>
-              <a:t>Abstraktion vom konkreten und abstrakten Syntax</a:t>
-            </a:r>
-          </a:p>
-          <a:p>
-            <a:r>
-              <a:rPr lang="de-DE" dirty="0" smtClean="0"/>
-              <a:t>Ist an sich eine Sprache zur Beschreibung von:</a:t>
-            </a:r>
-          </a:p>
-          <a:p>
-            <a:pPr lvl="1"/>
-            <a:r>
-              <a:rPr lang="de-DE" dirty="0" smtClean="0"/>
-              <a:t>Schemata</a:t>
-            </a:r>
-          </a:p>
-          <a:p>
-            <a:pPr lvl="1"/>
-            <a:r>
-              <a:rPr lang="de-DE" dirty="0" smtClean="0"/>
-              <a:t>Transformationen</a:t>
-            </a:r>
-            <a:endParaRPr lang="bg-BG" dirty="0"/>
-          </a:p>
-        </p:txBody>
-      </p:sp>
-      <p:sp>
-        <p:nvSpPr>
-          <p:cNvPr id="3" name="Title 2"/>
-          <p:cNvSpPr>
-            <a:spLocks noGrp="1"/>
-          </p:cNvSpPr>
-          <p:nvPr>
-            <p:ph type="title"/>
-          </p:nvPr>
-        </p:nvSpPr>
-        <p:spPr/>
-        <p:txBody>
-          <a:bodyPr/>
-          <a:lstStyle/>
-          <a:p>
-            <a:r>
-              <a:rPr lang="de-DE" dirty="0" smtClean="0"/>
-              <a:t>Indirekte Transformation mit variablem Schema</a:t>
-            </a:r>
-            <a:endParaRPr lang="bg-BG" dirty="0"/>
-          </a:p>
-        </p:txBody>
-      </p:sp>
-    </p:spTree>
-  </p:cSld>
-  <p:clrMapOvr>
-    <a:masterClrMapping/>
-  </p:clrMapOvr>
-</p:sld>
-</file>
-
-<file path=ppt/slides/slide14.xml><?xml version="1.0" encoding="utf-8"?>
 <p:sld xmlns:a="http://schemas.openxmlformats.org/drawingml/2006/main" xmlns:r="http://schemas.openxmlformats.org/officeDocument/2006/relationships" xmlns:p="http://schemas.openxmlformats.org/presentationml/2006/main">
   <p:cSld>
     <p:spTree>
@@ -2709,14 +2755,31 @@
             <p:ph type="title"/>
           </p:nvPr>
         </p:nvSpPr>
-        <p:spPr/>
+        <p:spPr>
+          <a:xfrm>
+            <a:off x="250825" y="195526"/>
+            <a:ext cx="8031163" cy="384721"/>
+          </a:xfrm>
+        </p:spPr>
         <p:txBody>
           <a:bodyPr/>
           <a:lstStyle/>
           <a:p>
             <a:r>
               <a:rPr lang="de-DE" dirty="0" smtClean="0"/>
-              <a:t>Diskussion &amp; Entscheidung</a:t>
+              <a:t>Transformationen  (IDP 1) </a:t>
+            </a:r>
+            <a:r>
+              <a:rPr lang="de-DE" dirty="0" smtClean="0"/>
+              <a:t>–</a:t>
+            </a:r>
+            <a:r>
+              <a:rPr lang="de-DE" dirty="0" smtClean="0"/>
+              <a:t> Diskussion </a:t>
+            </a:r>
+            <a:r>
+              <a:rPr lang="de-DE" dirty="0" smtClean="0"/>
+              <a:t>&amp; Entscheidung</a:t>
             </a:r>
             <a:endParaRPr lang="de-DE" dirty="0"/>
           </a:p>
@@ -3102,6 +3165,97 @@
 </p:sld>
 </file>
 
+<file path=ppt/slides/slide14.xml><?xml version="1.0" encoding="utf-8"?>
+<p:sld xmlns:a="http://schemas.openxmlformats.org/drawingml/2006/main" xmlns:r="http://schemas.openxmlformats.org/officeDocument/2006/relationships" xmlns:p="http://schemas.openxmlformats.org/presentationml/2006/main">
+  <p:cSld>
+    <p:spTree>
+      <p:nvGrpSpPr>
+        <p:cNvPr id="1" name=""/>
+        <p:cNvGrpSpPr/>
+        <p:nvPr/>
+      </p:nvGrpSpPr>
+      <p:grpSpPr>
+        <a:xfrm>
+          <a:off x="0" y="0"/>
+          <a:ext cx="0" cy="0"/>
+          <a:chOff x="0" y="0"/>
+          <a:chExt cx="0" cy="0"/>
+        </a:xfrm>
+      </p:grpSpPr>
+      <p:sp>
+        <p:nvSpPr>
+          <p:cNvPr id="3" name="Titel 2"/>
+          <p:cNvSpPr>
+            <a:spLocks noGrp="1"/>
+          </p:cNvSpPr>
+          <p:nvPr>
+            <p:ph type="title"/>
+          </p:nvPr>
+        </p:nvSpPr>
+        <p:spPr>
+          <a:xfrm>
+            <a:off x="250825" y="195526"/>
+            <a:ext cx="8031163" cy="600164"/>
+          </a:xfrm>
+        </p:spPr>
+        <p:txBody>
+          <a:bodyPr/>
+          <a:lstStyle/>
+          <a:p>
+            <a:r>
+              <a:rPr lang="de-DE" dirty="0" smtClean="0"/>
+              <a:t>Transformationen  (IDP 1) – Implementierung</a:t>
+            </a:r>
+            <a:r>
+              <a:rPr lang="de-DE" dirty="0" smtClean="0"/>
+              <a:t/>
+            </a:r>
+            <a:br>
+              <a:rPr lang="de-DE" dirty="0" smtClean="0"/>
+            </a:br>
+            <a:r>
+              <a:rPr lang="de-DE" sz="1400" dirty="0" smtClean="0"/>
+              <a:t>Konzept</a:t>
+            </a:r>
+            <a:endParaRPr lang="de-DE" sz="1400" dirty="0"/>
+          </a:p>
+        </p:txBody>
+      </p:sp>
+      <p:graphicFrame>
+        <p:nvGraphicFramePr>
+          <p:cNvPr id="4" name="Object 3"/>
+          <p:cNvGraphicFramePr>
+            <a:graphicFrameLocks noChangeAspect="1"/>
+          </p:cNvGraphicFramePr>
+          <p:nvPr/>
+        </p:nvGraphicFramePr>
+        <p:xfrm>
+          <a:off x="1819275" y="1347788"/>
+          <a:ext cx="5505450" cy="4162425"/>
+        </p:xfrm>
+        <a:graphic>
+          <a:graphicData uri="http://schemas.openxmlformats.org/presentationml/2006/ole">
+            <p:oleObj spid="_x0000_s1028" name="Visio" r:id="rId3" imgW="5505444" imgH="4162412" progId="Visio.Drawing.15">
+              <p:embed/>
+            </p:oleObj>
+          </a:graphicData>
+        </a:graphic>
+      </p:graphicFrame>
+    </p:spTree>
+  </p:cSld>
+  <p:clrMapOvr>
+    <a:masterClrMapping/>
+  </p:clrMapOvr>
+  <p:timing>
+    <p:tnLst>
+      <p:par>
+        <p:cTn id="1" dur="indefinite" restart="never" nodeType="tmRoot"/>
+      </p:par>
+    </p:tnLst>
+  </p:timing>
+</p:sld>
+</file>
+
 <file path=ppt/slides/slide15.xml><?xml version="1.0" encoding="utf-8"?>
 <p:sld xmlns:a="http://schemas.openxmlformats.org/drawingml/2006/main" xmlns:r="http://schemas.openxmlformats.org/officeDocument/2006/relationships" xmlns:p="http://schemas.openxmlformats.org/presentationml/2006/main">
   <p:cSld>
@@ -3121,7 +3275,7 @@
       </p:grpSpPr>
       <p:sp>
         <p:nvSpPr>
-          <p:cNvPr id="2" name="Textplatzhalter 1"/>
+          <p:cNvPr id="2" name="Text Placeholder 1"/>
           <p:cNvSpPr>
             <a:spLocks noGrp="1"/>
           </p:cNvSpPr>
@@ -3134,13 +3288,37 @@
           <a:bodyPr/>
           <a:lstStyle/>
           <a:p>
-            <a:endParaRPr lang="de-DE"/>
+            <a:r>
+              <a:rPr lang="de-DE" dirty="0" smtClean="0"/>
+              <a:t>Metamodel und Model</a:t>
+            </a:r>
+          </a:p>
+          <a:p>
+            <a:r>
+              <a:rPr lang="de-DE" dirty="0" smtClean="0"/>
+              <a:t>Viewpoint is auch Metamodel</a:t>
+            </a:r>
+          </a:p>
+          <a:p>
+            <a:r>
+              <a:rPr lang="de-DE" dirty="0" smtClean="0"/>
+              <a:t>Model ist implizit eine View mit dem entspr. Viewpoint</a:t>
+            </a:r>
+          </a:p>
+          <a:p>
+            <a:pPr>
+              <a:buNone/>
+            </a:pPr>
+            <a:endParaRPr lang="de-DE" dirty="0" smtClean="0"/>
+          </a:p>
+          <a:p>
+            <a:endParaRPr lang="bg-BG" dirty="0"/>
           </a:p>
         </p:txBody>
       </p:sp>
       <p:sp>
         <p:nvSpPr>
-          <p:cNvPr id="3" name="Titel 2"/>
+          <p:cNvPr id="3" name="Title 2"/>
           <p:cNvSpPr>
             <a:spLocks noGrp="1"/>
           </p:cNvSpPr>
@@ -3148,34 +3326,54 @@
             <p:ph type="title"/>
           </p:nvPr>
         </p:nvSpPr>
-        <p:spPr/>
+        <p:spPr>
+          <a:xfrm>
+            <a:off x="250825" y="195526"/>
+            <a:ext cx="8031163" cy="600164"/>
+          </a:xfrm>
+        </p:spPr>
         <p:txBody>
           <a:bodyPr/>
           <a:lstStyle/>
           <a:p>
             <a:r>
               <a:rPr lang="de-DE" dirty="0" smtClean="0"/>
-              <a:t>Implementierung - Konzept</a:t>
-            </a:r>
-            <a:endParaRPr lang="de-DE" dirty="0"/>
+              <a:t>Transformationen  (IDP 1) – Implementierung</a:t>
+            </a:r>
+            <a:r>
+              <a:rPr lang="de-DE" dirty="0" smtClean="0"/>
+              <a:t/>
+            </a:r>
+            <a:br>
+              <a:rPr lang="de-DE" dirty="0" smtClean="0"/>
+            </a:br>
+            <a:r>
+              <a:rPr lang="de-DE" sz="1400" dirty="0" smtClean="0"/>
+              <a:t>Metamodel </a:t>
+            </a:r>
+            <a:r>
+              <a:rPr lang="de-DE" sz="1400" dirty="0" smtClean="0"/>
+              <a:t>und Model</a:t>
+            </a:r>
+            <a:endParaRPr lang="bg-BG" sz="1400" dirty="0"/>
           </a:p>
         </p:txBody>
       </p:sp>
       <p:graphicFrame>
         <p:nvGraphicFramePr>
-          <p:cNvPr id="4" name="Object 3"/>
+          <p:cNvPr id="2051" name="Object 3"/>
           <p:cNvGraphicFramePr>
             <a:graphicFrameLocks noChangeAspect="1"/>
           </p:cNvGraphicFramePr>
           <p:nvPr/>
         </p:nvGraphicFramePr>
         <p:xfrm>
-          <a:off x="1819275" y="1347788"/>
-          <a:ext cx="5505450" cy="4162425"/>
+          <a:off x="250824" y="2500306"/>
+          <a:ext cx="6334473" cy="2755907"/>
         </p:xfrm>
         <a:graphic>
           <a:graphicData uri="http://schemas.openxmlformats.org/presentationml/2006/ole">
-            <p:oleObj spid="_x0000_s1028" name="Visio" r:id="rId3" imgW="5505444" imgH="4162412" progId="Visio.Drawing.15">
+            <p:oleObj spid="_x0000_s2055" name="Visio" r:id="rId3" imgW="7334205" imgH="3190939" progId="Visio.Drawing.15">
               <p:embed/>
             </p:oleObj>
           </a:graphicData>
@@ -3215,50 +3413,7 @@
       </p:grpSpPr>
       <p:sp>
         <p:nvSpPr>
-          <p:cNvPr id="2" name="Text Placeholder 1"/>
-          <p:cNvSpPr>
-            <a:spLocks noGrp="1"/>
-          </p:cNvSpPr>
-          <p:nvPr>
-            <p:ph type="body" sz="quarter" idx="10"/>
-          </p:nvPr>
-        </p:nvSpPr>
-        <p:spPr/>
-        <p:txBody>
-          <a:bodyPr/>
-          <a:lstStyle/>
-          <a:p>
-            <a:r>
-              <a:rPr lang="de-DE" dirty="0" smtClean="0"/>
-              <a:t>Metamodel und Model</a:t>
-            </a:r>
-          </a:p>
-          <a:p>
-            <a:r>
-              <a:rPr lang="de-DE" dirty="0" smtClean="0"/>
-              <a:t>Viewpoint is auch Metamodel</a:t>
-            </a:r>
-          </a:p>
-          <a:p>
-            <a:r>
-              <a:rPr lang="de-DE" dirty="0" smtClean="0"/>
-              <a:t>Model ist implizit eine View mit dem entspr. Viewpoint</a:t>
-            </a:r>
-          </a:p>
-          <a:p>
-            <a:pPr>
-              <a:buNone/>
-            </a:pPr>
-            <a:endParaRPr lang="de-DE" dirty="0" smtClean="0"/>
-          </a:p>
-          <a:p>
-            <a:endParaRPr lang="bg-BG" dirty="0"/>
-          </a:p>
-        </p:txBody>
-      </p:sp>
-      <p:sp>
-        <p:nvSpPr>
-          <p:cNvPr id="3" name="Title 2"/>
+          <p:cNvPr id="3" name="Titel 2"/>
           <p:cNvSpPr>
             <a:spLocks noGrp="1"/>
           </p:cNvSpPr>
@@ -3266,54 +3421,50 @@
             <p:ph type="title"/>
           </p:nvPr>
         </p:nvSpPr>
-        <p:spPr/>
+        <p:spPr>
+          <a:xfrm>
+            <a:off x="250825" y="195526"/>
+            <a:ext cx="8031163" cy="600164"/>
+          </a:xfrm>
+        </p:spPr>
         <p:txBody>
           <a:bodyPr/>
           <a:lstStyle/>
           <a:p>
             <a:r>
               <a:rPr lang="de-DE" dirty="0" smtClean="0"/>
-              <a:t>Implementierung – Metamodel und Model</a:t>
-            </a:r>
-            <a:endParaRPr lang="bg-BG" dirty="0"/>
+              <a:t>Transformationen  (IDP 1) – Implementierung</a:t>
+            </a:r>
+            <a:r>
+              <a:rPr lang="de-DE" dirty="0" smtClean="0"/>
+              <a:t/>
+            </a:r>
+            <a:br>
+              <a:rPr lang="de-DE" dirty="0" smtClean="0"/>
+            </a:br>
+            <a:r>
+              <a:rPr lang="de-DE" sz="1400" dirty="0" smtClean="0"/>
+              <a:t>Konzept</a:t>
+            </a:r>
+            <a:endParaRPr lang="de-DE" sz="1400" dirty="0"/>
           </a:p>
         </p:txBody>
       </p:sp>
       <p:graphicFrame>
         <p:nvGraphicFramePr>
-          <p:cNvPr id="2050" name="Object 2"/>
+          <p:cNvPr id="4" name="Object 3"/>
           <p:cNvGraphicFramePr>
             <a:graphicFrameLocks noChangeAspect="1"/>
           </p:cNvGraphicFramePr>
           <p:nvPr/>
         </p:nvGraphicFramePr>
         <p:xfrm>
-          <a:off x="5580063" y="785794"/>
-          <a:ext cx="3398522" cy="2071702"/>
+          <a:off x="1819275" y="1347788"/>
+          <a:ext cx="5505450" cy="4162425"/>
         </p:xfrm>
         <a:graphic>
           <a:graphicData uri="http://schemas.openxmlformats.org/presentationml/2006/ole">
-            <p:oleObj spid="_x0000_s2054" name="Visio" r:id="rId3" imgW="4171854" imgH="2543291" progId="Visio.Drawing.15">
-              <p:embed/>
-            </p:oleObj>
-          </a:graphicData>
-        </a:graphic>
-      </p:graphicFrame>
-      <p:graphicFrame>
-        <p:nvGraphicFramePr>
-          <p:cNvPr id="2051" name="Object 3"/>
-          <p:cNvGraphicFramePr>
-            <a:graphicFrameLocks noChangeAspect="1"/>
-          </p:cNvGraphicFramePr>
-          <p:nvPr/>
-        </p:nvGraphicFramePr>
-        <p:xfrm>
-          <a:off x="250824" y="2500306"/>
-          <a:ext cx="6334473" cy="2755907"/>
-        </p:xfrm>
-        <a:graphic>
-          <a:graphicData uri="http://schemas.openxmlformats.org/presentationml/2006/ole">
-            <p:oleObj spid="_x0000_s2055" name="Visio" r:id="rId4" imgW="7334205" imgH="3190939" progId="Visio.Drawing.15">
+            <p:oleObj spid="_x0000_s27650" name="Visio" r:id="rId3" imgW="5505444" imgH="4162412" progId="Visio.Drawing.15">
               <p:embed/>
             </p:oleObj>
           </a:graphicData>
@@ -3450,16 +3601,32 @@
             <p:ph type="title"/>
           </p:nvPr>
         </p:nvSpPr>
-        <p:spPr/>
+        <p:spPr>
+          <a:xfrm>
+            <a:off x="250825" y="195526"/>
+            <a:ext cx="8031163" cy="600164"/>
+          </a:xfrm>
+        </p:spPr>
         <p:txBody>
           <a:bodyPr/>
           <a:lstStyle/>
           <a:p>
             <a:r>
               <a:rPr lang="de-DE" dirty="0" smtClean="0"/>
-              <a:t>Implementierung - Transformationen</a:t>
-            </a:r>
-            <a:endParaRPr lang="bg-BG" dirty="0"/>
+              <a:t>Transformationen  (IDP 1) – Implementierung</a:t>
+            </a:r>
+            <a:r>
+              <a:rPr lang="de-DE" dirty="0" smtClean="0"/>
+              <a:t/>
+            </a:r>
+            <a:br>
+              <a:rPr lang="de-DE" dirty="0" smtClean="0"/>
+            </a:br>
+            <a:r>
+              <a:rPr lang="de-DE" sz="1400" dirty="0" smtClean="0"/>
+              <a:t>Realisierung der (Modell)Transformationen</a:t>
+            </a:r>
+            <a:endParaRPr lang="bg-BG" sz="1400" dirty="0"/>
           </a:p>
         </p:txBody>
       </p:sp>
@@ -3505,16 +3672,32 @@
             <p:ph type="title"/>
           </p:nvPr>
         </p:nvSpPr>
-        <p:spPr/>
+        <p:spPr>
+          <a:xfrm>
+            <a:off x="250825" y="195526"/>
+            <a:ext cx="8031163" cy="600164"/>
+          </a:xfrm>
+        </p:spPr>
         <p:txBody>
           <a:bodyPr/>
           <a:lstStyle/>
           <a:p>
             <a:r>
               <a:rPr lang="de-DE" dirty="0" smtClean="0"/>
-              <a:t>Implementierung – Beispiel UFM</a:t>
-            </a:r>
-            <a:endParaRPr lang="bg-BG" dirty="0"/>
+              <a:t>Transformationen  (IDP 1) – Implementierung</a:t>
+            </a:r>
+            <a:r>
+              <a:rPr lang="de-DE" dirty="0" smtClean="0"/>
+              <a:t/>
+            </a:r>
+            <a:br>
+              <a:rPr lang="de-DE" dirty="0" smtClean="0"/>
+            </a:br>
+            <a:r>
+              <a:rPr lang="de-DE" sz="1400" dirty="0" smtClean="0"/>
+              <a:t>Beispiel Umsatzorientierte Funtkionsmodellierung (UFM)</a:t>
+            </a:r>
+            <a:endParaRPr lang="bg-BG" sz="1400" dirty="0"/>
           </a:p>
         </p:txBody>
       </p:sp>
@@ -3643,16 +3826,32 @@
             <p:ph type="title"/>
           </p:nvPr>
         </p:nvSpPr>
-        <p:spPr/>
+        <p:spPr>
+          <a:xfrm>
+            <a:off x="250825" y="195526"/>
+            <a:ext cx="8031163" cy="600164"/>
+          </a:xfrm>
+        </p:spPr>
         <p:txBody>
           <a:bodyPr/>
           <a:lstStyle/>
           <a:p>
             <a:r>
               <a:rPr lang="de-DE" dirty="0" smtClean="0"/>
-              <a:t>Implementierung – Beispiel UFM</a:t>
-            </a:r>
-            <a:endParaRPr lang="bg-BG" dirty="0"/>
+              <a:t>Transformationen  (IDP 1) – Implementierung</a:t>
+            </a:r>
+            <a:r>
+              <a:rPr lang="de-DE" dirty="0" smtClean="0"/>
+              <a:t/>
+            </a:r>
+            <a:br>
+              <a:rPr lang="de-DE" dirty="0" smtClean="0"/>
+            </a:br>
+            <a:r>
+              <a:rPr lang="de-DE" sz="1400" dirty="0" smtClean="0"/>
+              <a:t>Beispiel Umsatzorientierte Funktionsmodellierung (UFM)</a:t>
+            </a:r>
+            <a:endParaRPr lang="bg-BG" sz="1400" dirty="0"/>
           </a:p>
         </p:txBody>
       </p:sp>
@@ -3700,7 +3899,6 @@
               <a:rPr lang="en-US" sz="1400" u="sng" dirty="0" smtClean="0"/>
               <a:t>:State</a:t>
             </a:r>
-            <a:endParaRPr lang="en-US" sz="1400" u="sng" dirty="0" smtClean="0"/>
           </a:p>
         </p:txBody>
       </p:sp>
@@ -3748,7 +3946,6 @@
               <a:rPr lang="en-US" sz="1400" u="sng" dirty="0" smtClean="0"/>
               <a:t>:Function</a:t>
             </a:r>
-            <a:endParaRPr lang="en-US" sz="1400" u="sng" dirty="0" smtClean="0"/>
           </a:p>
         </p:txBody>
       </p:sp>
@@ -3870,7 +4067,6 @@
               <a:rPr lang="en-US" sz="1400" u="sng" dirty="0" smtClean="0"/>
               <a:t>:Block</a:t>
             </a:r>
-            <a:endParaRPr lang="en-US" sz="1400" u="sng" dirty="0" smtClean="0"/>
           </a:p>
         </p:txBody>
       </p:sp>
@@ -3918,7 +4114,6 @@
               <a:rPr lang="en-US" sz="1400" u="sng" dirty="0" smtClean="0"/>
               <a:t>:Block</a:t>
             </a:r>
-            <a:endParaRPr lang="en-US" sz="1400" u="sng" dirty="0" smtClean="0"/>
           </a:p>
         </p:txBody>
       </p:sp>
@@ -4750,14 +4945,27 @@
             <p:ph type="body" sz="quarter" idx="10"/>
           </p:nvPr>
         </p:nvSpPr>
-        <p:spPr/>
+        <p:spPr>
+          <a:xfrm>
+            <a:off x="250824" y="933450"/>
+            <a:ext cx="8321704" cy="4495813"/>
+          </a:xfrm>
+        </p:spPr>
         <p:txBody>
           <a:bodyPr/>
           <a:lstStyle/>
           <a:p>
             <a:r>
               <a:rPr lang="en-US" dirty="0" err="1" smtClean="0"/>
-              <a:t>Implikationen</a:t>
+              <a:t>Wissen</a:t>
+            </a:r>
+            <a:r>
+              <a:rPr lang="en-US" dirty="0" smtClean="0"/>
+              <a:t> in </a:t>
+            </a:r>
+            <a:r>
+              <a:rPr lang="en-US" dirty="0" err="1" smtClean="0"/>
+              <a:t>fachspezifischen</a:t>
             </a:r>
             <a:r>
               <a:rPr lang="en-US" dirty="0" smtClean="0"/>
@@ -4765,7 +4973,7 @@
             </a:r>
             <a:r>
               <a:rPr lang="en-US" dirty="0" err="1" smtClean="0"/>
-              <a:t>aus</a:t>
+              <a:t>Modellen</a:t>
             </a:r>
             <a:r>
               <a:rPr lang="en-US" dirty="0" smtClean="0"/>
@@ -4773,7 +4981,14 @@
             </a:r>
             <a:r>
               <a:rPr lang="en-US" dirty="0" err="1" smtClean="0"/>
-              <a:t>fachfremden</a:t>
+              <a:t>verteilt</a:t>
+            </a:r>
+            <a:endParaRPr lang="en-US" dirty="0" smtClean="0"/>
+          </a:p>
+          <a:p>
+            <a:r>
+              <a:rPr lang="en-US" dirty="0" err="1" smtClean="0"/>
+              <a:t>Kollaboration</a:t>
             </a:r>
             <a:r>
               <a:rPr lang="en-US" dirty="0" smtClean="0"/>
@@ -4781,7 +4996,14 @@
             </a:r>
             <a:r>
               <a:rPr lang="en-US" dirty="0" err="1" smtClean="0"/>
-              <a:t>Modellen</a:t>
+              <a:t>erforderlich</a:t>
+            </a:r>
+            <a:endParaRPr lang="en-US" dirty="0" smtClean="0"/>
+          </a:p>
+          <a:p>
+            <a:r>
+              <a:rPr lang="en-US" dirty="0" err="1" smtClean="0"/>
+              <a:t>Konsistentes</a:t>
             </a:r>
             <a:r>
               <a:rPr lang="en-US" dirty="0" smtClean="0"/>
@@ -4789,42 +5011,43 @@
             </a:r>
             <a:r>
               <a:rPr lang="en-US" dirty="0" err="1" smtClean="0"/>
-              <a:t>erkennen</a:t>
+              <a:t>Bild</a:t>
+            </a:r>
+            <a:r>
+              <a:rPr lang="en-US" dirty="0" smtClean="0"/>
+              <a:t> </a:t>
+            </a:r>
+            <a:r>
+              <a:rPr lang="en-US" dirty="0" err="1" smtClean="0"/>
+              <a:t>schwer</a:t>
             </a:r>
             <a:endParaRPr lang="en-US" dirty="0" smtClean="0"/>
           </a:p>
           <a:p>
+            <a:pPr>
+              <a:buNone/>
+            </a:pPr>
+            <a:r>
+              <a:rPr lang="en-US" dirty="0" smtClean="0"/>
+              <a:t> </a:t>
+            </a:r>
+            <a:r>
+              <a:rPr lang="en-US" dirty="0" smtClean="0"/>
+              <a:t>   </a:t>
+            </a:r>
             <a:r>
               <a:rPr lang="en-US" dirty="0" err="1" smtClean="0"/>
-              <a:t>Kollaboration</a:t>
+              <a:t>zu</a:t>
+            </a:r>
+            <a:r>
+              <a:rPr lang="en-US" dirty="0" smtClean="0"/>
+              <a:t> </a:t>
+            </a:r>
+            <a:r>
+              <a:rPr lang="en-US" dirty="0" err="1" smtClean="0"/>
+              <a:t>schaffen</a:t>
             </a:r>
             <a:endParaRPr lang="en-US" dirty="0" smtClean="0"/>
-          </a:p>
-          <a:p>
-            <a:r>
-              <a:rPr lang="en-US" dirty="0" err="1" smtClean="0"/>
-              <a:t>Konsistentes</a:t>
-            </a:r>
-            <a:r>
-              <a:rPr lang="en-US" dirty="0" smtClean="0"/>
-              <a:t>, </a:t>
-            </a:r>
-            <a:r>
-              <a:rPr lang="en-US" dirty="0" err="1" smtClean="0"/>
-              <a:t>gemeinsames</a:t>
-            </a:r>
-            <a:r>
-              <a:rPr lang="en-US" dirty="0" smtClean="0"/>
-              <a:t/>
-            </a:r>
-            <a:br>
-              <a:rPr lang="en-US" dirty="0" smtClean="0"/>
-            </a:br>
-            <a:r>
-              <a:rPr lang="en-US" dirty="0" err="1" smtClean="0"/>
-              <a:t>Bild</a:t>
-            </a:r>
-            <a:endParaRPr lang="en-US" dirty="0"/>
           </a:p>
         </p:txBody>
       </p:sp>
@@ -4853,19 +5076,19 @@
       </p:sp>
       <p:graphicFrame>
         <p:nvGraphicFramePr>
-          <p:cNvPr id="4" name="Objekt 3"/>
+          <p:cNvPr id="9219" name="Object 3"/>
           <p:cNvGraphicFramePr>
             <a:graphicFrameLocks noChangeAspect="1"/>
           </p:cNvGraphicFramePr>
           <p:nvPr/>
         </p:nvGraphicFramePr>
         <p:xfrm>
-          <a:off x="2267744" y="1484784"/>
-          <a:ext cx="6660232" cy="4592785"/>
+          <a:off x="1746037" y="1285860"/>
+          <a:ext cx="7064575" cy="4689480"/>
         </p:xfrm>
         <a:graphic>
           <a:graphicData uri="http://schemas.openxmlformats.org/presentationml/2006/ole">
-            <p:oleObj spid="_x0000_s9217" name="Visio" r:id="rId3" imgW="9448740" imgH="6505669" progId="Visio.Drawing.15">
+            <p:oleObj spid="_x0000_s9219" name="Visio" r:id="rId3" imgW="10363251" imgH="6886536" progId="Visio.Drawing.15">
               <p:embed/>
             </p:oleObj>
           </a:graphicData>
@@ -4996,16 +5219,36 @@
             <p:ph type="title"/>
           </p:nvPr>
         </p:nvSpPr>
-        <p:spPr/>
+        <p:spPr>
+          <a:xfrm>
+            <a:off x="250825" y="195526"/>
+            <a:ext cx="8031163" cy="600164"/>
+          </a:xfrm>
+        </p:spPr>
         <p:txBody>
           <a:bodyPr/>
           <a:lstStyle/>
           <a:p>
             <a:r>
               <a:rPr lang="de-DE" dirty="0" smtClean="0"/>
-              <a:t>Implementierung – Technische Aspekte</a:t>
-            </a:r>
-            <a:endParaRPr lang="bg-BG" dirty="0"/>
+              <a:t>Transformationen  (IDP 1) – Implementierung</a:t>
+            </a:r>
+            <a:r>
+              <a:rPr lang="de-DE" dirty="0" smtClean="0"/>
+              <a:t/>
+            </a:r>
+            <a:br>
+              <a:rPr lang="de-DE" dirty="0" smtClean="0"/>
+            </a:br>
+            <a:r>
+              <a:rPr lang="de-DE" sz="1400" dirty="0" smtClean="0"/>
+              <a:t>Technische </a:t>
+            </a:r>
+            <a:r>
+              <a:rPr lang="de-DE" sz="1400" dirty="0" smtClean="0"/>
+              <a:t>Aspekte</a:t>
+            </a:r>
+            <a:endParaRPr lang="bg-BG" sz="1400" dirty="0"/>
           </a:p>
         </p:txBody>
       </p:sp>
@@ -5043,67 +5286,6 @@
       </p:grpSpPr>
       <p:sp>
         <p:nvSpPr>
-          <p:cNvPr id="2" name="Textplatzhalter 1"/>
-          <p:cNvSpPr>
-            <a:spLocks noGrp="1"/>
-          </p:cNvSpPr>
-          <p:nvPr>
-            <p:ph type="body" sz="quarter" idx="10"/>
-          </p:nvPr>
-        </p:nvSpPr>
-        <p:spPr/>
-        <p:txBody>
-          <a:bodyPr/>
-          <a:lstStyle/>
-          <a:p>
-            <a:r>
-              <a:rPr lang="de-DE" dirty="0" smtClean="0"/>
-              <a:t>Motivation</a:t>
-            </a:r>
-          </a:p>
-          <a:p>
-            <a:r>
-              <a:rPr lang="de-DE" dirty="0" smtClean="0"/>
-              <a:t>Forschungsrichtungen</a:t>
-            </a:r>
-          </a:p>
-          <a:p>
-            <a:r>
-              <a:rPr lang="de-DE" dirty="0" smtClean="0"/>
-              <a:t>Transformationen</a:t>
-            </a:r>
-          </a:p>
-          <a:p>
-            <a:r>
-              <a:rPr lang="de-DE" b="1" dirty="0" smtClean="0"/>
-              <a:t>Visualisierung</a:t>
-            </a:r>
-          </a:p>
-          <a:p>
-            <a:r>
-              <a:rPr lang="de-DE" dirty="0" smtClean="0"/>
-              <a:t>Ergebnisse</a:t>
-            </a:r>
-          </a:p>
-          <a:p>
-            <a:r>
-              <a:rPr lang="de-DE" dirty="0" smtClean="0"/>
-              <a:t>DEMO</a:t>
-            </a:r>
-          </a:p>
-          <a:p>
-            <a:r>
-              <a:rPr lang="de-DE" dirty="0" smtClean="0"/>
-              <a:t>Ausblick</a:t>
-            </a:r>
-          </a:p>
-          <a:p>
-            <a:endParaRPr lang="de-DE" dirty="0"/>
-          </a:p>
-        </p:txBody>
-      </p:sp>
-      <p:sp>
-        <p:nvSpPr>
           <p:cNvPr id="3" name="Titel 2"/>
           <p:cNvSpPr>
             <a:spLocks noGrp="1"/>
@@ -5122,6 +5304,369 @@
               <a:t>Agenda</a:t>
             </a:r>
             <a:endParaRPr lang="de-DE" dirty="0"/>
+          </a:p>
+        </p:txBody>
+      </p:sp>
+      <p:sp>
+        <p:nvSpPr>
+          <p:cNvPr id="5" name="Textplatzhalter 1"/>
+          <p:cNvSpPr txBox="1">
+            <a:spLocks/>
+          </p:cNvSpPr>
+          <p:nvPr/>
+        </p:nvSpPr>
+        <p:spPr>
+          <a:xfrm>
+            <a:off x="403224" y="1085850"/>
+            <a:ext cx="5329239" cy="4495813"/>
+          </a:xfrm>
+          <a:prstGeom prst="rect">
+            <a:avLst/>
+          </a:prstGeom>
+        </p:spPr>
+        <p:txBody>
+          <a:bodyPr/>
+          <a:lstStyle/>
+          <a:p>
+            <a:pPr marL="266700" marR="0" lvl="0" indent="-266700" algn="l" defTabSz="914400" rtl="0" eaLnBrk="1" fontAlgn="base" latinLnBrk="0" hangingPunct="1">
+              <a:lnSpc>
+                <a:spcPct val="150000"/>
+              </a:lnSpc>
+              <a:spcBef>
+                <a:spcPct val="20000"/>
+              </a:spcBef>
+              <a:spcAft>
+                <a:spcPct val="0"/>
+              </a:spcAft>
+              <a:buClr>
+                <a:srgbClr val="0065BD"/>
+              </a:buClr>
+              <a:buSzTx/>
+              <a:buFont typeface="Arial" charset="0"/>
+              <a:buChar char="●"/>
+              <a:tabLst/>
+              <a:defRPr/>
+            </a:pPr>
+            <a:r>
+              <a:rPr kumimoji="0" lang="de-DE" sz="2000" b="0" i="0" u="none" strike="noStrike" kern="0" cap="none" spc="0" normalizeH="0" baseline="0" noProof="0" dirty="0" smtClean="0">
+                <a:ln>
+                  <a:noFill/>
+                </a:ln>
+                <a:solidFill>
+                  <a:schemeClr val="tx1"/>
+                </a:solidFill>
+                <a:effectLst/>
+                <a:uLnTx/>
+                <a:uFillTx/>
+                <a:latin typeface="Arial" charset="0"/>
+                <a:ea typeface="+mn-ea"/>
+                <a:cs typeface="+mn-cs"/>
+              </a:rPr>
+              <a:t>Motivation</a:t>
+            </a:r>
+          </a:p>
+          <a:p>
+            <a:pPr marL="266700" marR="0" lvl="0" indent="-266700" algn="l" defTabSz="914400" rtl="0" eaLnBrk="1" fontAlgn="base" latinLnBrk="0" hangingPunct="1">
+              <a:lnSpc>
+                <a:spcPct val="150000"/>
+              </a:lnSpc>
+              <a:spcBef>
+                <a:spcPct val="20000"/>
+              </a:spcBef>
+              <a:spcAft>
+                <a:spcPct val="0"/>
+              </a:spcAft>
+              <a:buClr>
+                <a:srgbClr val="0065BD"/>
+              </a:buClr>
+              <a:buSzTx/>
+              <a:buFont typeface="Arial" charset="0"/>
+              <a:buChar char="●"/>
+              <a:tabLst/>
+              <a:defRPr/>
+            </a:pPr>
+            <a:r>
+              <a:rPr kumimoji="0" lang="de-DE" sz="2000" i="0" u="none" strike="noStrike" kern="0" cap="none" spc="0" normalizeH="0" baseline="0" noProof="0" dirty="0" smtClean="0">
+                <a:ln>
+                  <a:noFill/>
+                </a:ln>
+                <a:solidFill>
+                  <a:schemeClr val="tx1"/>
+                </a:solidFill>
+                <a:effectLst/>
+                <a:uLnTx/>
+                <a:uFillTx/>
+                <a:latin typeface="Arial" charset="0"/>
+                <a:ea typeface="+mn-ea"/>
+                <a:cs typeface="+mn-cs"/>
+              </a:rPr>
+              <a:t>Forschungsrichtungen</a:t>
+            </a:r>
+            <a:endParaRPr kumimoji="0" lang="de-DE" sz="2000" b="1" i="0" u="none" strike="noStrike" kern="0" cap="none" spc="0" normalizeH="0" baseline="0" noProof="0" dirty="0" smtClean="0">
+              <a:ln>
+                <a:noFill/>
+              </a:ln>
+              <a:solidFill>
+                <a:schemeClr val="tx1"/>
+              </a:solidFill>
+              <a:effectLst/>
+              <a:uLnTx/>
+              <a:uFillTx/>
+              <a:latin typeface="Arial" charset="0"/>
+              <a:ea typeface="+mn-ea"/>
+              <a:cs typeface="+mn-cs"/>
+            </a:endParaRPr>
+          </a:p>
+          <a:p>
+            <a:pPr marL="266700" marR="0" lvl="0" indent="-266700" algn="l" defTabSz="914400" rtl="0" eaLnBrk="1" fontAlgn="base" latinLnBrk="0" hangingPunct="1">
+              <a:lnSpc>
+                <a:spcPct val="150000"/>
+              </a:lnSpc>
+              <a:spcBef>
+                <a:spcPct val="20000"/>
+              </a:spcBef>
+              <a:spcAft>
+                <a:spcPct val="0"/>
+              </a:spcAft>
+              <a:buClr>
+                <a:srgbClr val="0065BD"/>
+              </a:buClr>
+              <a:buSzTx/>
+              <a:buFont typeface="Arial" charset="0"/>
+              <a:buChar char="●"/>
+              <a:tabLst/>
+              <a:defRPr/>
+            </a:pPr>
+            <a:r>
+              <a:rPr kumimoji="0" lang="de-DE" sz="2000" i="0" u="none" strike="noStrike" kern="0" cap="none" spc="0" normalizeH="0" baseline="0" noProof="0" dirty="0" smtClean="0">
+                <a:ln>
+                  <a:noFill/>
+                </a:ln>
+                <a:solidFill>
+                  <a:schemeClr val="tx1"/>
+                </a:solidFill>
+                <a:effectLst/>
+                <a:uLnTx/>
+                <a:uFillTx/>
+                <a:latin typeface="Arial" charset="0"/>
+                <a:ea typeface="+mn-ea"/>
+                <a:cs typeface="+mn-cs"/>
+              </a:rPr>
+              <a:t>Transformationen (IDP 1)</a:t>
+            </a:r>
+            <a:endParaRPr lang="de-DE" kern="0" noProof="0" dirty="0" smtClean="0">
+              <a:solidFill>
+                <a:schemeClr val="tx1"/>
+              </a:solidFill>
+            </a:endParaRPr>
+          </a:p>
+          <a:p>
+            <a:pPr marL="266700" marR="0" lvl="0" indent="-266700" algn="l" defTabSz="914400" rtl="0" eaLnBrk="1" fontAlgn="base" latinLnBrk="0" hangingPunct="1">
+              <a:lnSpc>
+                <a:spcPct val="150000"/>
+              </a:lnSpc>
+              <a:spcBef>
+                <a:spcPct val="20000"/>
+              </a:spcBef>
+              <a:spcAft>
+                <a:spcPct val="0"/>
+              </a:spcAft>
+              <a:buClr>
+                <a:srgbClr val="0065BD"/>
+              </a:buClr>
+              <a:buSzTx/>
+              <a:buFont typeface="Arial" charset="0"/>
+              <a:buChar char="●"/>
+              <a:tabLst/>
+              <a:defRPr/>
+            </a:pPr>
+            <a:r>
+              <a:rPr kumimoji="0" lang="de-DE" sz="2000" b="1" i="0" u="none" strike="noStrike" kern="0" cap="none" spc="0" normalizeH="0" baseline="0" noProof="0" dirty="0" smtClean="0">
+                <a:ln>
+                  <a:noFill/>
+                </a:ln>
+                <a:solidFill>
+                  <a:schemeClr val="tx1"/>
+                </a:solidFill>
+                <a:effectLst/>
+                <a:uLnTx/>
+                <a:uFillTx/>
+                <a:latin typeface="Arial" charset="0"/>
+                <a:ea typeface="+mn-ea"/>
+                <a:cs typeface="+mn-cs"/>
+              </a:rPr>
+              <a:t>Visualisierung (IDP 2)</a:t>
+            </a:r>
+          </a:p>
+          <a:p>
+            <a:pPr marL="723900" lvl="1" indent="-266700">
+              <a:spcBef>
+                <a:spcPct val="20000"/>
+              </a:spcBef>
+              <a:buClr>
+                <a:srgbClr val="0065BD"/>
+              </a:buClr>
+              <a:buFont typeface="Arial" charset="0"/>
+              <a:buChar char="●"/>
+            </a:pPr>
+            <a:r>
+              <a:rPr lang="de-DE" sz="1800" dirty="0" smtClean="0"/>
+              <a:t>Ziele</a:t>
+            </a:r>
+          </a:p>
+          <a:p>
+            <a:pPr marL="723900" lvl="1" indent="-266700">
+              <a:spcBef>
+                <a:spcPct val="20000"/>
+              </a:spcBef>
+              <a:buClr>
+                <a:srgbClr val="0065BD"/>
+              </a:buClr>
+              <a:buFont typeface="Arial" charset="0"/>
+              <a:buChar char="●"/>
+            </a:pPr>
+            <a:r>
+              <a:rPr lang="de-DE" sz="1800" dirty="0" smtClean="0"/>
+              <a:t>Realisierung der Ziele</a:t>
+            </a:r>
+            <a:endParaRPr lang="de-DE" sz="1800" dirty="0" smtClean="0"/>
+          </a:p>
+          <a:p>
+            <a:pPr marL="723900" lvl="1" indent="-266700">
+              <a:spcBef>
+                <a:spcPct val="20000"/>
+              </a:spcBef>
+              <a:buClr>
+                <a:srgbClr val="0065BD"/>
+              </a:buClr>
+              <a:buFont typeface="Arial" charset="0"/>
+              <a:buChar char="●"/>
+            </a:pPr>
+            <a:r>
+              <a:rPr lang="de-DE" sz="1800" dirty="0" smtClean="0"/>
+              <a:t>Technische Grundlagen</a:t>
+            </a:r>
+            <a:endParaRPr lang="de-DE" sz="1800" dirty="0" smtClean="0"/>
+          </a:p>
+          <a:p>
+            <a:pPr marL="723900" lvl="1" indent="-266700">
+              <a:spcBef>
+                <a:spcPct val="20000"/>
+              </a:spcBef>
+              <a:buClr>
+                <a:srgbClr val="0065BD"/>
+              </a:buClr>
+              <a:buFont typeface="Arial" charset="0"/>
+              <a:buChar char="●"/>
+            </a:pPr>
+            <a:r>
+              <a:rPr lang="de-DE" sz="1800" dirty="0" smtClean="0"/>
+              <a:t>Implementierung</a:t>
+            </a:r>
+            <a:endParaRPr kumimoji="0" lang="de-DE" sz="2000" b="0" i="0" u="none" strike="noStrike" kern="0" cap="none" spc="0" normalizeH="0" baseline="0" noProof="0" dirty="0" smtClean="0">
+              <a:ln>
+                <a:noFill/>
+              </a:ln>
+              <a:solidFill>
+                <a:schemeClr val="tx1"/>
+              </a:solidFill>
+              <a:effectLst/>
+              <a:uLnTx/>
+              <a:uFillTx/>
+              <a:latin typeface="Arial" charset="0"/>
+              <a:ea typeface="+mn-ea"/>
+              <a:cs typeface="+mn-cs"/>
+            </a:endParaRPr>
+          </a:p>
+          <a:p>
+            <a:pPr marL="266700" marR="0" lvl="0" indent="-266700" algn="l" defTabSz="914400" rtl="0" eaLnBrk="1" fontAlgn="base" latinLnBrk="0" hangingPunct="1">
+              <a:lnSpc>
+                <a:spcPct val="150000"/>
+              </a:lnSpc>
+              <a:spcBef>
+                <a:spcPct val="20000"/>
+              </a:spcBef>
+              <a:spcAft>
+                <a:spcPct val="0"/>
+              </a:spcAft>
+              <a:buClr>
+                <a:srgbClr val="0065BD"/>
+              </a:buClr>
+              <a:buSzTx/>
+              <a:buFont typeface="Arial" charset="0"/>
+              <a:buChar char="●"/>
+              <a:tabLst/>
+              <a:defRPr/>
+            </a:pPr>
+            <a:r>
+              <a:rPr kumimoji="0" lang="de-DE" sz="2000" b="0" i="0" u="none" strike="noStrike" kern="0" cap="none" spc="0" normalizeH="0" baseline="0" noProof="0" dirty="0" smtClean="0">
+                <a:ln>
+                  <a:noFill/>
+                </a:ln>
+                <a:solidFill>
+                  <a:schemeClr val="tx1"/>
+                </a:solidFill>
+                <a:effectLst/>
+                <a:uLnTx/>
+                <a:uFillTx/>
+                <a:latin typeface="Arial" charset="0"/>
+                <a:ea typeface="+mn-ea"/>
+                <a:cs typeface="+mn-cs"/>
+              </a:rPr>
+              <a:t>Ergebnisse</a:t>
+            </a:r>
+          </a:p>
+          <a:p>
+            <a:pPr marL="266700" marR="0" lvl="0" indent="-266700" algn="l" defTabSz="914400" rtl="0" eaLnBrk="1" fontAlgn="base" latinLnBrk="0" hangingPunct="1">
+              <a:lnSpc>
+                <a:spcPct val="150000"/>
+              </a:lnSpc>
+              <a:spcBef>
+                <a:spcPct val="20000"/>
+              </a:spcBef>
+              <a:spcAft>
+                <a:spcPct val="0"/>
+              </a:spcAft>
+              <a:buClr>
+                <a:srgbClr val="0065BD"/>
+              </a:buClr>
+              <a:buSzTx/>
+              <a:buFont typeface="Arial" charset="0"/>
+              <a:buChar char="●"/>
+              <a:tabLst/>
+              <a:defRPr/>
+            </a:pPr>
+            <a:r>
+              <a:rPr kumimoji="0" lang="de-DE" sz="2000" b="0" i="0" u="none" strike="noStrike" kern="0" cap="none" spc="0" normalizeH="0" baseline="0" noProof="0" dirty="0" smtClean="0">
+                <a:ln>
+                  <a:noFill/>
+                </a:ln>
+                <a:solidFill>
+                  <a:schemeClr val="tx1"/>
+                </a:solidFill>
+                <a:effectLst/>
+                <a:uLnTx/>
+                <a:uFillTx/>
+                <a:latin typeface="Arial" charset="0"/>
+                <a:ea typeface="+mn-ea"/>
+                <a:cs typeface="+mn-cs"/>
+              </a:rPr>
+              <a:t>Ausblick</a:t>
+            </a:r>
+            <a:endParaRPr kumimoji="0" lang="de-DE" sz="2000" b="0" i="0" u="none" strike="noStrike" kern="0" cap="none" spc="0" normalizeH="0" baseline="0" noProof="0" dirty="0">
+              <a:ln>
+                <a:noFill/>
+              </a:ln>
+              <a:solidFill>
+                <a:schemeClr val="tx1"/>
+              </a:solidFill>
+              <a:effectLst/>
+              <a:uLnTx/>
+              <a:uFillTx/>
+              <a:latin typeface="Arial" charset="0"/>
+              <a:ea typeface="+mn-ea"/>
+              <a:cs typeface="+mn-cs"/>
+            </a:endParaRPr>
           </a:p>
         </p:txBody>
       </p:sp>
@@ -5268,7 +5813,7 @@
           <a:p>
             <a:r>
               <a:rPr lang="de-DE" dirty="0" smtClean="0"/>
-              <a:t>Visualisierung</a:t>
+              <a:t>Visualisierung – TODO edit</a:t>
             </a:r>
             <a:endParaRPr lang="de-DE" dirty="0"/>
           </a:p>
@@ -5371,7 +5916,11 @@
           <a:p>
             <a:r>
               <a:rPr lang="de-DE" dirty="0" smtClean="0"/>
-              <a:t>Ziele</a:t>
+              <a:t>Visualisierung (IDP 2) </a:t>
+            </a:r>
+            <a:r>
+              <a:rPr lang="de-DE" dirty="0" smtClean="0"/>
+              <a:t>– Ziele</a:t>
             </a:r>
             <a:endParaRPr lang="de-DE" dirty="0"/>
           </a:p>
@@ -5563,7 +6112,11 @@
           <a:p>
             <a:r>
               <a:rPr lang="de-DE" dirty="0" smtClean="0"/>
-              <a:t>Realisierung der Ziele</a:t>
+              <a:t>Visualisierung (IDP 2) – Realisierung </a:t>
+            </a:r>
+            <a:r>
+              <a:rPr lang="de-DE" dirty="0" smtClean="0"/>
+              <a:t>der Ziele</a:t>
             </a:r>
             <a:endParaRPr lang="de-DE" dirty="0"/>
           </a:p>
@@ -5702,7 +6255,11 @@
           <a:p>
             <a:r>
               <a:rPr lang="de-DE" dirty="0" smtClean="0"/>
-              <a:t>Technische Grundlagen</a:t>
+              <a:t>Visualisierung (IDP 2) – Technische </a:t>
+            </a:r>
+            <a:r>
+              <a:rPr lang="de-DE" dirty="0" smtClean="0"/>
+              <a:t>Grundlagen</a:t>
             </a:r>
             <a:endParaRPr lang="de-DE" dirty="0"/>
           </a:p>
@@ -5762,24 +6319,20 @@
           <a:p>
             <a:r>
               <a:rPr lang="de-DE" dirty="0" smtClean="0"/>
-              <a:t>Implementierung</a:t>
+              <a:t>Visualisierung (IDP 2) – Implementierung</a:t>
+            </a:r>
+            <a:r>
+              <a:rPr lang="de-DE" dirty="0" smtClean="0"/>
+              <a:t/>
             </a:r>
             <a:br>
               <a:rPr lang="de-DE" dirty="0" smtClean="0"/>
             </a:br>
             <a:r>
-              <a:rPr lang="de-DE" sz="1400" b="0" dirty="0" smtClean="0"/>
-              <a:t>Aufbau des </a:t>
-            </a:r>
-            <a:r>
-              <a:rPr lang="de-DE" sz="1400" b="0" dirty="0" err="1" smtClean="0"/>
-              <a:t>Viz</a:t>
-            </a:r>
-            <a:r>
-              <a:rPr lang="de-DE" sz="1400" b="0" dirty="0" smtClean="0"/>
-              <a:t>-Modells</a:t>
-            </a:r>
-            <a:endParaRPr lang="de-DE" sz="1400" b="0" dirty="0"/>
+              <a:rPr lang="de-DE" sz="1400" dirty="0" smtClean="0"/>
+              <a:t>Aufbau des Viz-Modells</a:t>
+            </a:r>
+            <a:endParaRPr lang="de-DE" sz="1400" dirty="0"/>
           </a:p>
         </p:txBody>
       </p:sp>
@@ -5860,14 +6413,18 @@
           <a:lstStyle/>
           <a:p>
             <a:r>
+              <a:rPr lang="de-DE" dirty="0" smtClean="0"/>
+              <a:t>Visualisierung (IDP 2) – Implementierung</a:t>
+            </a:r>
+            <a:r>
               <a:rPr lang="de-DE" dirty="0"/>
-              <a:t>Implementierung</a:t>
+              <a:t/>
             </a:r>
             <a:br>
               <a:rPr lang="de-DE" dirty="0"/>
             </a:br>
             <a:r>
-              <a:rPr lang="de-DE" sz="1400" b="0" dirty="0" smtClean="0"/>
+              <a:rPr lang="de-DE" sz="1400" dirty="0" smtClean="0"/>
               <a:t>Einlesen von Daten</a:t>
             </a:r>
             <a:endParaRPr lang="de-DE" sz="1400" dirty="0"/>
@@ -5901,7 +6458,7 @@
     </p:spTree>
     <p:extLst>
       <p:ext uri="{BB962C8B-B14F-4D97-AF65-F5344CB8AC3E}">
-        <p14:creationId xmlns:p14="http://schemas.microsoft.com/office/powerpoint/2010/main" xmlns="" val="427906190"/>
+        <p14:creationId xmlns="" xmlns:p14="http://schemas.microsoft.com/office/powerpoint/2010/main" val="427906190"/>
       </p:ext>
     </p:extLst>
   </p:cSld>
@@ -5956,8 +6513,8 @@
           <a:lstStyle/>
           <a:p>
             <a:r>
-              <a:rPr lang="de-DE" dirty="0" err="1" smtClean="0"/>
-              <a:t>GraphView</a:t>
+              <a:rPr lang="de-DE" dirty="0" smtClean="0"/>
+              <a:t>Visualisierung (IDP 2) – GraphView</a:t>
             </a:r>
             <a:r>
               <a:rPr lang="de-DE" b="0" dirty="0" smtClean="0"/>
@@ -5967,7 +6524,7 @@
               <a:rPr lang="de-DE" b="0" dirty="0" smtClean="0"/>
             </a:br>
             <a:r>
-              <a:rPr lang="de-DE" sz="1400" b="0" dirty="0" smtClean="0"/>
+              <a:rPr lang="de-DE" sz="1400" dirty="0" smtClean="0"/>
               <a:t>Visualisierung </a:t>
             </a:r>
             <a:endParaRPr lang="de-DE" sz="1400" dirty="0"/>
@@ -6001,7 +6558,7 @@
     </p:spTree>
     <p:extLst>
       <p:ext uri="{BB962C8B-B14F-4D97-AF65-F5344CB8AC3E}">
-        <p14:creationId xmlns:p14="http://schemas.microsoft.com/office/powerpoint/2010/main" xmlns="" val="3871759119"/>
+        <p14:creationId xmlns="" xmlns:p14="http://schemas.microsoft.com/office/powerpoint/2010/main" val="3871759119"/>
       </p:ext>
     </p:extLst>
   </p:cSld>
@@ -6056,8 +6613,8 @@
           <a:lstStyle/>
           <a:p>
             <a:r>
-              <a:rPr lang="de-DE" dirty="0" err="1" smtClean="0"/>
-              <a:t>GraphView</a:t>
+              <a:rPr lang="de-DE" dirty="0" smtClean="0"/>
+              <a:t>Visualisierung (IDP 2) – GraphView</a:t>
             </a:r>
             <a:r>
               <a:rPr lang="de-DE" b="0" dirty="0" smtClean="0"/>
@@ -6067,7 +6624,7 @@
               <a:rPr lang="de-DE" b="0" dirty="0" smtClean="0"/>
             </a:br>
             <a:r>
-              <a:rPr lang="de-DE" sz="1400" b="0" dirty="0" smtClean="0"/>
+              <a:rPr lang="de-DE" sz="1400" dirty="0" smtClean="0"/>
               <a:t>Modifikationen</a:t>
             </a:r>
             <a:endParaRPr lang="de-DE" dirty="0"/>
@@ -6562,7 +7119,7 @@
     </p:spTree>
     <p:extLst>
       <p:ext uri="{BB962C8B-B14F-4D97-AF65-F5344CB8AC3E}">
-        <p14:creationId xmlns:p14="http://schemas.microsoft.com/office/powerpoint/2010/main" xmlns="" val="492424617"/>
+        <p14:creationId xmlns="" xmlns:p14="http://schemas.microsoft.com/office/powerpoint/2010/main" val="492424617"/>
       </p:ext>
     </p:extLst>
   </p:cSld>
@@ -6617,11 +7174,7 @@
             </a:r>
             <a:r>
               <a:rPr lang="en-US" dirty="0" smtClean="0"/>
-              <a:t>Concept </a:t>
-            </a:r>
-            <a:r>
-              <a:rPr lang="en-US" dirty="0" smtClean="0"/>
-              <a:t>for an Integration-framework to enable the </a:t>
+              <a:t>Concept for an Integration-framework to enable the </a:t>
             </a:r>
             <a:r>
               <a:rPr lang="en-US" dirty="0" err="1" smtClean="0"/>
@@ -6629,21 +7182,12 @@
             </a:r>
             <a:r>
               <a:rPr lang="en-US" dirty="0" smtClean="0"/>
-              <a:t> </a:t>
+              <a:t>  development of product-service-systems</a:t>
             </a:r>
             <a:r>
               <a:rPr lang="en-US" dirty="0" smtClean="0"/>
-              <a:t> development </a:t>
-            </a:r>
-            <a:r>
-              <a:rPr lang="en-US" dirty="0" smtClean="0"/>
-              <a:t>of </a:t>
-            </a:r>
-            <a:r>
-              <a:rPr lang="en-US" dirty="0" smtClean="0"/>
-              <a:t>product-service-systems”</a:t>
-            </a:r>
-            <a:endParaRPr lang="de-DE" dirty="0" smtClean="0"/>
+              <a:t>”</a:t>
+            </a:r>
           </a:p>
         </p:txBody>
       </p:sp>
@@ -6663,8 +7207,8 @@
           <a:lstStyle/>
           <a:p>
             <a:r>
-              <a:rPr lang="de-DE" smtClean="0"/>
-              <a:t>Grundlage</a:t>
+              <a:rPr lang="de-DE" dirty="0" smtClean="0"/>
+              <a:t>Grundlage – Das PSS-Integrationsframework (PSS-IF)</a:t>
             </a:r>
             <a:endParaRPr lang="bg-BG" dirty="0"/>
           </a:p>
@@ -6707,6 +7251,13 @@
   <p:clrMapOvr>
     <a:masterClrMapping/>
   </p:clrMapOvr>
+  <p:timing>
+    <p:tnLst>
+      <p:par>
+        <p:cTn id="1" dur="indefinite" restart="never" nodeType="tmRoot"/>
+      </p:par>
+    </p:tnLst>
+  </p:timing>
 </p:sld>
 </file>
 
@@ -6748,8 +7299,8 @@
           <a:lstStyle/>
           <a:p>
             <a:r>
-              <a:rPr lang="de-DE" dirty="0" err="1" smtClean="0"/>
-              <a:t>GraphView</a:t>
+              <a:rPr lang="de-DE" dirty="0" smtClean="0"/>
+              <a:t>Visualisierung (IDP 2) – GraphView</a:t>
             </a:r>
             <a:r>
               <a:rPr lang="de-DE" b="0" dirty="0" smtClean="0"/>
@@ -6759,7 +7310,7 @@
               <a:rPr lang="de-DE" b="0" dirty="0" smtClean="0"/>
             </a:br>
             <a:r>
-              <a:rPr lang="de-DE" sz="1400" b="0" dirty="0" smtClean="0"/>
+              <a:rPr lang="de-DE" sz="1400" dirty="0" smtClean="0"/>
               <a:t>Analysen</a:t>
             </a:r>
             <a:endParaRPr lang="de-DE" dirty="0"/>
@@ -6835,7 +7386,7 @@
     </p:spTree>
     <p:extLst>
       <p:ext uri="{BB962C8B-B14F-4D97-AF65-F5344CB8AC3E}">
-        <p14:creationId xmlns:p14="http://schemas.microsoft.com/office/powerpoint/2010/main" xmlns="" val="3583291954"/>
+        <p14:creationId xmlns="" xmlns:p14="http://schemas.microsoft.com/office/powerpoint/2010/main" val="3583291954"/>
       </p:ext>
     </p:extLst>
   </p:cSld>
@@ -6978,8 +7529,8 @@
           <a:lstStyle/>
           <a:p>
             <a:r>
-              <a:rPr lang="de-DE" dirty="0" err="1" smtClean="0"/>
-              <a:t>GraphView</a:t>
+              <a:rPr lang="de-DE" dirty="0" smtClean="0"/>
+              <a:t>Visualisierung (IDP 2) – GraphView</a:t>
             </a:r>
             <a:r>
               <a:rPr lang="de-DE" b="0" dirty="0" smtClean="0"/>
@@ -6989,7 +7540,7 @@
               <a:rPr lang="de-DE" b="0" dirty="0" smtClean="0"/>
             </a:br>
             <a:r>
-              <a:rPr lang="de-DE" sz="1400" b="0" dirty="0" smtClean="0"/>
+              <a:rPr lang="de-DE" sz="1400" dirty="0" smtClean="0"/>
               <a:t>Analysen</a:t>
             </a:r>
             <a:endParaRPr lang="de-DE" sz="1400" dirty="0"/>
@@ -7008,7 +7559,7 @@
           <a:blip r:embed="rId2" cstate="print">
             <a:extLst>
               <a:ext uri="{28A0092B-C50C-407E-A947-70E740481C1C}">
-                <a14:useLocalDpi xmlns:a14="http://schemas.microsoft.com/office/drawing/2010/main" xmlns="" val="0"/>
+                <a14:useLocalDpi xmlns="" xmlns:a14="http://schemas.microsoft.com/office/drawing/2010/main" val="0"/>
               </a:ext>
             </a:extLst>
           </a:blip>
@@ -7029,7 +7580,7 @@
     </p:spTree>
     <p:extLst>
       <p:ext uri="{BB962C8B-B14F-4D97-AF65-F5344CB8AC3E}">
-        <p14:creationId xmlns:p14="http://schemas.microsoft.com/office/powerpoint/2010/main" xmlns="" val="2307760257"/>
+        <p14:creationId xmlns="" xmlns:p14="http://schemas.microsoft.com/office/powerpoint/2010/main" val="2307760257"/>
       </p:ext>
     </p:extLst>
   </p:cSld>
@@ -7084,8 +7635,8 @@
           <a:lstStyle/>
           <a:p>
             <a:r>
-              <a:rPr lang="de-DE" dirty="0" err="1" smtClean="0"/>
-              <a:t>GraphView</a:t>
+              <a:rPr lang="de-DE" dirty="0" smtClean="0"/>
+              <a:t>Visualisierung (IDP 2) – GraphView</a:t>
             </a:r>
             <a:r>
               <a:rPr lang="de-DE" b="0" dirty="0" smtClean="0"/>
@@ -7095,7 +7646,7 @@
               <a:rPr lang="de-DE" b="0" dirty="0" smtClean="0"/>
             </a:br>
             <a:r>
-              <a:rPr lang="de-DE" sz="1400" b="0" dirty="0" smtClean="0"/>
+              <a:rPr lang="de-DE" sz="1400" dirty="0" smtClean="0"/>
               <a:t>Aufbau Filter</a:t>
             </a:r>
             <a:r>
@@ -7121,7 +7672,7 @@
           <a:blip r:embed="rId2" cstate="print">
             <a:extLst>
               <a:ext uri="{28A0092B-C50C-407E-A947-70E740481C1C}">
-                <a14:useLocalDpi xmlns:a14="http://schemas.microsoft.com/office/drawing/2010/main" xmlns="" val="0"/>
+                <a14:useLocalDpi xmlns="" xmlns:a14="http://schemas.microsoft.com/office/drawing/2010/main" val="0"/>
               </a:ext>
             </a:extLst>
           </a:blip>
@@ -7142,7 +7693,7 @@
     </p:spTree>
     <p:extLst>
       <p:ext uri="{BB962C8B-B14F-4D97-AF65-F5344CB8AC3E}">
-        <p14:creationId xmlns:p14="http://schemas.microsoft.com/office/powerpoint/2010/main" xmlns="" val="2583957788"/>
+        <p14:creationId xmlns="" xmlns:p14="http://schemas.microsoft.com/office/powerpoint/2010/main" val="2583957788"/>
       </p:ext>
     </p:extLst>
   </p:cSld>
@@ -7260,8 +7811,8 @@
           <a:lstStyle/>
           <a:p>
             <a:r>
-              <a:rPr lang="de-DE" dirty="0" err="1" smtClean="0"/>
-              <a:t>MatrixView</a:t>
+              <a:rPr lang="de-DE" dirty="0" smtClean="0"/>
+              <a:t>Visualisierung (IDP 2) – MatrixView</a:t>
             </a:r>
             <a:endParaRPr lang="de-DE" dirty="0"/>
           </a:p>
@@ -7294,7 +7845,7 @@
     </p:spTree>
     <p:extLst>
       <p:ext uri="{BB962C8B-B14F-4D97-AF65-F5344CB8AC3E}">
-        <p14:creationId xmlns:p14="http://schemas.microsoft.com/office/powerpoint/2010/main" xmlns="" val="834335964"/>
+        <p14:creationId xmlns="" xmlns:p14="http://schemas.microsoft.com/office/powerpoint/2010/main" val="834335964"/>
       </p:ext>
     </p:extLst>
   </p:cSld>
@@ -7330,68 +7881,6 @@
       </p:grpSpPr>
       <p:sp>
         <p:nvSpPr>
-          <p:cNvPr id="2" name="Textplatzhalter 1"/>
-          <p:cNvSpPr>
-            <a:spLocks noGrp="1"/>
-          </p:cNvSpPr>
-          <p:nvPr>
-            <p:ph type="body" sz="quarter" idx="10"/>
-          </p:nvPr>
-        </p:nvSpPr>
-        <p:spPr/>
-        <p:txBody>
-          <a:bodyPr/>
-          <a:lstStyle/>
-          <a:p>
-            <a:r>
-              <a:rPr lang="de-DE" dirty="0" smtClean="0"/>
-              <a:t>Motivation</a:t>
-            </a:r>
-          </a:p>
-          <a:p>
-            <a:r>
-              <a:rPr lang="de-DE" dirty="0" smtClean="0"/>
-              <a:t>Forschungsrichtungen</a:t>
-            </a:r>
-          </a:p>
-          <a:p>
-            <a:r>
-              <a:rPr lang="de-DE" dirty="0" smtClean="0"/>
-              <a:t>Transformationen</a:t>
-            </a:r>
-          </a:p>
-          <a:p>
-            <a:r>
-              <a:rPr lang="de-DE" dirty="0" smtClean="0"/>
-              <a:t>Visualisierung</a:t>
-            </a:r>
-          </a:p>
-          <a:p>
-            <a:r>
-              <a:rPr lang="de-DE" b="1" dirty="0" smtClean="0"/>
-              <a:t>Ergebnisse</a:t>
-            </a:r>
-            <a:endParaRPr lang="de-DE" dirty="0" smtClean="0"/>
-          </a:p>
-          <a:p>
-            <a:r>
-              <a:rPr lang="de-DE" dirty="0" smtClean="0"/>
-              <a:t>DEMO</a:t>
-            </a:r>
-          </a:p>
-          <a:p>
-            <a:r>
-              <a:rPr lang="de-DE" dirty="0" smtClean="0"/>
-              <a:t>Ausblick</a:t>
-            </a:r>
-          </a:p>
-          <a:p>
-            <a:endParaRPr lang="de-DE" dirty="0"/>
-          </a:p>
-        </p:txBody>
-      </p:sp>
-      <p:sp>
-        <p:nvSpPr>
           <p:cNvPr id="3" name="Titel 2"/>
           <p:cNvSpPr>
             <a:spLocks noGrp="1"/>
@@ -7410,6 +7899,338 @@
               <a:t>Agenda</a:t>
             </a:r>
             <a:endParaRPr lang="de-DE" dirty="0"/>
+          </a:p>
+        </p:txBody>
+      </p:sp>
+      <p:sp>
+        <p:nvSpPr>
+          <p:cNvPr id="5" name="Textplatzhalter 1"/>
+          <p:cNvSpPr txBox="1">
+            <a:spLocks/>
+          </p:cNvSpPr>
+          <p:nvPr/>
+        </p:nvSpPr>
+        <p:spPr>
+          <a:xfrm>
+            <a:off x="403224" y="1085850"/>
+            <a:ext cx="5329239" cy="4495813"/>
+          </a:xfrm>
+          <a:prstGeom prst="rect">
+            <a:avLst/>
+          </a:prstGeom>
+        </p:spPr>
+        <p:txBody>
+          <a:bodyPr/>
+          <a:lstStyle/>
+          <a:p>
+            <a:pPr marL="266700" marR="0" lvl="0" indent="-266700" algn="l" defTabSz="914400" rtl="0" eaLnBrk="1" fontAlgn="base" latinLnBrk="0" hangingPunct="1">
+              <a:lnSpc>
+                <a:spcPct val="150000"/>
+              </a:lnSpc>
+              <a:spcBef>
+                <a:spcPct val="20000"/>
+              </a:spcBef>
+              <a:spcAft>
+                <a:spcPct val="0"/>
+              </a:spcAft>
+              <a:buClr>
+                <a:srgbClr val="0065BD"/>
+              </a:buClr>
+              <a:buSzTx/>
+              <a:buFont typeface="Arial" charset="0"/>
+              <a:buChar char="●"/>
+              <a:tabLst/>
+              <a:defRPr/>
+            </a:pPr>
+            <a:r>
+              <a:rPr kumimoji="0" lang="de-DE" sz="2000" b="0" i="0" u="none" strike="noStrike" kern="0" cap="none" spc="0" normalizeH="0" baseline="0" noProof="0" dirty="0" smtClean="0">
+                <a:ln>
+                  <a:noFill/>
+                </a:ln>
+                <a:solidFill>
+                  <a:schemeClr val="tx1"/>
+                </a:solidFill>
+                <a:effectLst/>
+                <a:uLnTx/>
+                <a:uFillTx/>
+                <a:latin typeface="Arial" charset="0"/>
+                <a:ea typeface="+mn-ea"/>
+                <a:cs typeface="+mn-cs"/>
+              </a:rPr>
+              <a:t>Motivation</a:t>
+            </a:r>
+          </a:p>
+          <a:p>
+            <a:pPr marL="266700" marR="0" lvl="0" indent="-266700" algn="l" defTabSz="914400" rtl="0" eaLnBrk="1" fontAlgn="base" latinLnBrk="0" hangingPunct="1">
+              <a:lnSpc>
+                <a:spcPct val="150000"/>
+              </a:lnSpc>
+              <a:spcBef>
+                <a:spcPct val="20000"/>
+              </a:spcBef>
+              <a:spcAft>
+                <a:spcPct val="0"/>
+              </a:spcAft>
+              <a:buClr>
+                <a:srgbClr val="0065BD"/>
+              </a:buClr>
+              <a:buSzTx/>
+              <a:buFont typeface="Arial" charset="0"/>
+              <a:buChar char="●"/>
+              <a:tabLst/>
+              <a:defRPr/>
+            </a:pPr>
+            <a:r>
+              <a:rPr kumimoji="0" lang="de-DE" sz="2000" i="0" u="none" strike="noStrike" kern="0" cap="none" spc="0" normalizeH="0" baseline="0" noProof="0" dirty="0" smtClean="0">
+                <a:ln>
+                  <a:noFill/>
+                </a:ln>
+                <a:solidFill>
+                  <a:schemeClr val="tx1"/>
+                </a:solidFill>
+                <a:effectLst/>
+                <a:uLnTx/>
+                <a:uFillTx/>
+                <a:latin typeface="Arial" charset="0"/>
+                <a:ea typeface="+mn-ea"/>
+                <a:cs typeface="+mn-cs"/>
+              </a:rPr>
+              <a:t>Forschungsrichtungen</a:t>
+            </a:r>
+            <a:endParaRPr kumimoji="0" lang="de-DE" sz="2000" b="1" i="0" u="none" strike="noStrike" kern="0" cap="none" spc="0" normalizeH="0" baseline="0" noProof="0" dirty="0" smtClean="0">
+              <a:ln>
+                <a:noFill/>
+              </a:ln>
+              <a:solidFill>
+                <a:schemeClr val="tx1"/>
+              </a:solidFill>
+              <a:effectLst/>
+              <a:uLnTx/>
+              <a:uFillTx/>
+              <a:latin typeface="Arial" charset="0"/>
+              <a:ea typeface="+mn-ea"/>
+              <a:cs typeface="+mn-cs"/>
+            </a:endParaRPr>
+          </a:p>
+          <a:p>
+            <a:pPr marL="266700" marR="0" lvl="0" indent="-266700" algn="l" defTabSz="914400" rtl="0" eaLnBrk="1" fontAlgn="base" latinLnBrk="0" hangingPunct="1">
+              <a:lnSpc>
+                <a:spcPct val="150000"/>
+              </a:lnSpc>
+              <a:spcBef>
+                <a:spcPct val="20000"/>
+              </a:spcBef>
+              <a:spcAft>
+                <a:spcPct val="0"/>
+              </a:spcAft>
+              <a:buClr>
+                <a:srgbClr val="0065BD"/>
+              </a:buClr>
+              <a:buSzTx/>
+              <a:buFont typeface="Arial" charset="0"/>
+              <a:buChar char="●"/>
+              <a:tabLst/>
+              <a:defRPr/>
+            </a:pPr>
+            <a:r>
+              <a:rPr kumimoji="0" lang="de-DE" sz="2000" i="0" u="none" strike="noStrike" kern="0" cap="none" spc="0" normalizeH="0" baseline="0" noProof="0" dirty="0" smtClean="0">
+                <a:ln>
+                  <a:noFill/>
+                </a:ln>
+                <a:solidFill>
+                  <a:schemeClr val="tx1"/>
+                </a:solidFill>
+                <a:effectLst/>
+                <a:uLnTx/>
+                <a:uFillTx/>
+                <a:latin typeface="Arial" charset="0"/>
+                <a:ea typeface="+mn-ea"/>
+                <a:cs typeface="+mn-cs"/>
+              </a:rPr>
+              <a:t>Transformationen (IDP 1)</a:t>
+            </a:r>
+            <a:endParaRPr lang="de-DE" kern="0" noProof="0" dirty="0" smtClean="0">
+              <a:solidFill>
+                <a:schemeClr val="tx1"/>
+              </a:solidFill>
+            </a:endParaRPr>
+          </a:p>
+          <a:p>
+            <a:pPr marL="266700" marR="0" lvl="0" indent="-266700" algn="l" defTabSz="914400" rtl="0" eaLnBrk="1" fontAlgn="base" latinLnBrk="0" hangingPunct="1">
+              <a:lnSpc>
+                <a:spcPct val="150000"/>
+              </a:lnSpc>
+              <a:spcBef>
+                <a:spcPct val="20000"/>
+              </a:spcBef>
+              <a:spcAft>
+                <a:spcPct val="0"/>
+              </a:spcAft>
+              <a:buClr>
+                <a:srgbClr val="0065BD"/>
+              </a:buClr>
+              <a:buSzTx/>
+              <a:buFont typeface="Arial" charset="0"/>
+              <a:buChar char="●"/>
+              <a:tabLst/>
+              <a:defRPr/>
+            </a:pPr>
+            <a:r>
+              <a:rPr kumimoji="0" lang="de-DE" sz="2000" i="0" u="none" strike="noStrike" kern="0" cap="none" spc="0" normalizeH="0" baseline="0" noProof="0" dirty="0" smtClean="0">
+                <a:ln>
+                  <a:noFill/>
+                </a:ln>
+                <a:solidFill>
+                  <a:schemeClr val="tx1"/>
+                </a:solidFill>
+                <a:effectLst/>
+                <a:uLnTx/>
+                <a:uFillTx/>
+                <a:latin typeface="Arial" charset="0"/>
+                <a:ea typeface="+mn-ea"/>
+                <a:cs typeface="+mn-cs"/>
+              </a:rPr>
+              <a:t>Visualisierung (IDP 2)</a:t>
+            </a:r>
+          </a:p>
+          <a:p>
+            <a:pPr marL="266700" marR="0" lvl="0" indent="-266700" algn="l" defTabSz="914400" rtl="0" eaLnBrk="1" fontAlgn="base" latinLnBrk="0" hangingPunct="1">
+              <a:lnSpc>
+                <a:spcPct val="150000"/>
+              </a:lnSpc>
+              <a:spcBef>
+                <a:spcPct val="20000"/>
+              </a:spcBef>
+              <a:spcAft>
+                <a:spcPct val="0"/>
+              </a:spcAft>
+              <a:buClr>
+                <a:srgbClr val="0065BD"/>
+              </a:buClr>
+              <a:buSzTx/>
+              <a:buFont typeface="Arial" charset="0"/>
+              <a:buChar char="●"/>
+              <a:tabLst/>
+              <a:defRPr/>
+            </a:pPr>
+            <a:r>
+              <a:rPr kumimoji="0" lang="de-DE" sz="2000" b="1" i="0" u="none" strike="noStrike" kern="0" cap="none" spc="0" normalizeH="0" baseline="0" noProof="0" dirty="0" smtClean="0">
+                <a:ln>
+                  <a:noFill/>
+                </a:ln>
+                <a:solidFill>
+                  <a:schemeClr val="tx1"/>
+                </a:solidFill>
+                <a:effectLst/>
+                <a:uLnTx/>
+                <a:uFillTx/>
+                <a:latin typeface="Arial" charset="0"/>
+                <a:ea typeface="+mn-ea"/>
+                <a:cs typeface="+mn-cs"/>
+              </a:rPr>
+              <a:t>Ergebnisse</a:t>
+            </a:r>
+          </a:p>
+          <a:p>
+            <a:pPr marL="723900" lvl="1" indent="-266700">
+              <a:spcBef>
+                <a:spcPct val="20000"/>
+              </a:spcBef>
+              <a:buClr>
+                <a:srgbClr val="0065BD"/>
+              </a:buClr>
+              <a:buFont typeface="Arial" charset="0"/>
+              <a:buChar char="●"/>
+            </a:pPr>
+            <a:r>
+              <a:rPr lang="de-DE" sz="1800" kern="0" dirty="0" smtClean="0">
+                <a:solidFill>
+                  <a:schemeClr val="tx1"/>
+                </a:solidFill>
+              </a:rPr>
+              <a:t>Transformationen</a:t>
+            </a:r>
+          </a:p>
+          <a:p>
+            <a:pPr marL="723900" lvl="1" indent="-266700">
+              <a:spcBef>
+                <a:spcPct val="20000"/>
+              </a:spcBef>
+              <a:buClr>
+                <a:srgbClr val="0065BD"/>
+              </a:buClr>
+              <a:buFont typeface="Arial" charset="0"/>
+              <a:buChar char="●"/>
+            </a:pPr>
+            <a:r>
+              <a:rPr kumimoji="0" lang="de-DE" sz="1800" b="0" i="0" u="none" strike="noStrike" kern="0" cap="none" spc="0" normalizeH="0" baseline="0" noProof="0" dirty="0" smtClean="0">
+                <a:ln>
+                  <a:noFill/>
+                </a:ln>
+                <a:solidFill>
+                  <a:schemeClr val="tx1"/>
+                </a:solidFill>
+                <a:effectLst/>
+                <a:uLnTx/>
+                <a:uFillTx/>
+                <a:latin typeface="Arial" charset="0"/>
+                <a:ea typeface="+mn-ea"/>
+                <a:cs typeface="+mn-cs"/>
+              </a:rPr>
+              <a:t>Visualisierung</a:t>
+            </a:r>
+          </a:p>
+          <a:p>
+            <a:pPr marL="266700" marR="0" lvl="0" indent="-266700" algn="l" defTabSz="914400" rtl="0" eaLnBrk="1" fontAlgn="base" latinLnBrk="0" hangingPunct="1">
+              <a:lnSpc>
+                <a:spcPct val="150000"/>
+              </a:lnSpc>
+              <a:spcBef>
+                <a:spcPct val="20000"/>
+              </a:spcBef>
+              <a:spcAft>
+                <a:spcPct val="0"/>
+              </a:spcAft>
+              <a:buClr>
+                <a:srgbClr val="0065BD"/>
+              </a:buClr>
+              <a:buSzTx/>
+              <a:buFont typeface="Arial" charset="0"/>
+              <a:buChar char="●"/>
+              <a:tabLst/>
+              <a:defRPr/>
+            </a:pPr>
+            <a:r>
+              <a:rPr kumimoji="0" lang="de-DE" sz="2000" b="0" i="0" u="none" strike="noStrike" kern="0" cap="none" spc="0" normalizeH="0" baseline="0" noProof="0" dirty="0" smtClean="0">
+                <a:ln>
+                  <a:noFill/>
+                </a:ln>
+                <a:solidFill>
+                  <a:schemeClr val="tx1"/>
+                </a:solidFill>
+                <a:effectLst/>
+                <a:uLnTx/>
+                <a:uFillTx/>
+                <a:latin typeface="Arial" charset="0"/>
+                <a:ea typeface="+mn-ea"/>
+                <a:cs typeface="+mn-cs"/>
+              </a:rPr>
+              <a:t>Ausblick</a:t>
+            </a:r>
+            <a:endParaRPr kumimoji="0" lang="de-DE" sz="2000" b="0" i="0" u="none" strike="noStrike" kern="0" cap="none" spc="0" normalizeH="0" baseline="0" noProof="0" dirty="0">
+              <a:ln>
+                <a:noFill/>
+              </a:ln>
+              <a:solidFill>
+                <a:schemeClr val="tx1"/>
+              </a:solidFill>
+              <a:effectLst/>
+              <a:uLnTx/>
+              <a:uFillTx/>
+              <a:latin typeface="Arial" charset="0"/>
+              <a:ea typeface="+mn-ea"/>
+              <a:cs typeface="+mn-cs"/>
+            </a:endParaRPr>
           </a:p>
         </p:txBody>
       </p:sp>
@@ -7575,10 +8396,10 @@
               <a:rPr lang="de-DE" dirty="0"/>
             </a:br>
             <a:r>
-              <a:rPr lang="de-DE" sz="1400" b="0" dirty="0" smtClean="0"/>
+              <a:rPr lang="de-DE" sz="1400" dirty="0" smtClean="0"/>
               <a:t>Transformationen</a:t>
             </a:r>
-            <a:endParaRPr lang="de-DE" sz="1400" b="0" dirty="0"/>
+            <a:endParaRPr lang="de-DE" sz="1400" dirty="0"/>
           </a:p>
         </p:txBody>
       </p:sp>
@@ -7736,17 +8557,17 @@
               <a:rPr lang="de-DE" dirty="0" smtClean="0"/>
             </a:br>
             <a:r>
-              <a:rPr lang="de-DE" sz="1400" b="0" dirty="0" smtClean="0"/>
+              <a:rPr lang="de-DE" sz="1400" dirty="0" smtClean="0"/>
               <a:t>Visualisierung</a:t>
             </a:r>
-            <a:endParaRPr lang="de-DE" sz="1400" b="0" dirty="0"/>
+            <a:endParaRPr lang="de-DE" sz="1400" dirty="0"/>
           </a:p>
         </p:txBody>
       </p:sp>
     </p:spTree>
     <p:extLst>
       <p:ext uri="{BB962C8B-B14F-4D97-AF65-F5344CB8AC3E}">
-        <p14:creationId xmlns:p14="http://schemas.microsoft.com/office/powerpoint/2010/main" xmlns="" val="3015326985"/>
+        <p14:creationId xmlns="" xmlns:p14="http://schemas.microsoft.com/office/powerpoint/2010/main" val="3015326985"/>
       </p:ext>
     </p:extLst>
   </p:cSld>
@@ -7782,36 +8603,156 @@
       </p:grpSpPr>
       <p:sp>
         <p:nvSpPr>
-          <p:cNvPr id="5" name="Textfeld 4"/>
-          <p:cNvSpPr txBox="1"/>
-          <p:nvPr/>
+          <p:cNvPr id="2" name="Textplatzhalter 1"/>
+          <p:cNvSpPr>
+            <a:spLocks noGrp="1"/>
+          </p:cNvSpPr>
+          <p:nvPr>
+            <p:ph type="body" sz="quarter" idx="10"/>
+          </p:nvPr>
         </p:nvSpPr>
         <p:spPr>
           <a:xfrm>
-            <a:off x="2195736" y="2420888"/>
-            <a:ext cx="4752528" cy="1200329"/>
+            <a:off x="250824" y="933450"/>
+            <a:ext cx="8031164" cy="4495813"/>
           </a:xfrm>
-          <a:prstGeom prst="rect">
-            <a:avLst/>
-          </a:prstGeom>
-          <a:noFill/>
         </p:spPr>
         <p:txBody>
-          <a:bodyPr wrap="square" rtlCol="0">
-            <a:spAutoFit/>
-          </a:bodyPr>
+          <a:bodyPr/>
           <a:lstStyle/>
           <a:p>
-            <a:pPr algn="ctr"/>
-            <a:r>
-              <a:rPr lang="de-DE" sz="7200" b="1" dirty="0" smtClean="0"/>
-              <a:t>DEMO</a:t>
-            </a:r>
-            <a:endParaRPr lang="de-DE" sz="7200" b="1" dirty="0"/>
+            <a:r>
+              <a:rPr lang="de-DE" dirty="0" smtClean="0"/>
+              <a:t>Repository</a:t>
+            </a:r>
+          </a:p>
+          <a:p>
+            <a:pPr lvl="1"/>
+            <a:r>
+              <a:rPr lang="de-DE" dirty="0" smtClean="0"/>
+              <a:t>Zentrale verwaltung eines Modells</a:t>
+            </a:r>
+          </a:p>
+          <a:p>
+            <a:pPr lvl="1"/>
+            <a:r>
+              <a:rPr lang="de-DE" dirty="0" smtClean="0"/>
+              <a:t>Alle Rollen arbeiten durch geeignete Viewpoints auf dassselbe Modell</a:t>
+            </a:r>
+          </a:p>
+          <a:p>
+            <a:pPr lvl="1"/>
+            <a:r>
+              <a:rPr lang="de-DE" dirty="0" smtClean="0"/>
+              <a:t>Konsistenz und kollaboration dadurch transparent möglich</a:t>
+            </a:r>
+            <a:endParaRPr lang="de-DE" dirty="0" smtClean="0"/>
+          </a:p>
+          <a:p>
+            <a:r>
+              <a:rPr lang="de-DE" dirty="0" smtClean="0"/>
+              <a:t>Mögliche </a:t>
+            </a:r>
+            <a:r>
+              <a:rPr lang="de-DE" dirty="0"/>
+              <a:t>Verbesserungen</a:t>
+            </a:r>
+          </a:p>
+          <a:p>
+            <a:pPr lvl="1"/>
+            <a:r>
+              <a:rPr lang="de-DE" dirty="0"/>
+              <a:t>Intelligenter Model Merger</a:t>
+            </a:r>
+          </a:p>
+          <a:p>
+            <a:pPr lvl="1"/>
+            <a:r>
+              <a:rPr lang="de-DE" dirty="0"/>
+              <a:t>JUNG2 Layouts für große Knoten optimieren</a:t>
+            </a:r>
+          </a:p>
+          <a:p>
+            <a:pPr lvl="1"/>
+            <a:r>
+              <a:rPr lang="de-DE" dirty="0"/>
+              <a:t>Mehrere „Kontaktpunkte“ für Elemente des Graphen definieren</a:t>
+            </a:r>
+          </a:p>
+          <a:p>
+            <a:r>
+              <a:rPr lang="de-DE" dirty="0"/>
+              <a:t>Mögliche Erweiterungen</a:t>
+            </a:r>
+          </a:p>
+          <a:p>
+            <a:pPr lvl="1"/>
+            <a:r>
+              <a:rPr lang="de-DE" dirty="0"/>
+              <a:t>Weitere Filter einbinden (z.B. Filter über aggregierte Attribut Werte)</a:t>
+            </a:r>
+          </a:p>
+          <a:p>
+            <a:pPr lvl="1"/>
+            <a:r>
+              <a:rPr lang="de-DE" dirty="0"/>
+              <a:t>Modifikation des Gesamtmodells in der Matrix View erlauben</a:t>
+            </a:r>
+          </a:p>
+          <a:p>
+            <a:pPr lvl="1"/>
+            <a:r>
+              <a:rPr lang="de-DE" dirty="0"/>
+              <a:t>Lösch und </a:t>
+            </a:r>
+            <a:r>
+              <a:rPr lang="de-DE" dirty="0" err="1"/>
+              <a:t>Merge</a:t>
+            </a:r>
+            <a:r>
+              <a:rPr lang="de-DE" dirty="0"/>
+              <a:t> Operationen implementieren (PSS-IF Core muss erweitert werden)</a:t>
+            </a:r>
+          </a:p>
+          <a:p>
+            <a:endParaRPr lang="de-DE" dirty="0"/>
+          </a:p>
+        </p:txBody>
+      </p:sp>
+      <p:sp>
+        <p:nvSpPr>
+          <p:cNvPr id="3" name="Titel 2"/>
+          <p:cNvSpPr>
+            <a:spLocks noGrp="1"/>
+          </p:cNvSpPr>
+          <p:nvPr>
+            <p:ph type="title"/>
+          </p:nvPr>
+        </p:nvSpPr>
+        <p:spPr>
+          <a:xfrm>
+            <a:off x="250825" y="195526"/>
+            <a:ext cx="8031163" cy="384721"/>
+          </a:xfrm>
+        </p:spPr>
+        <p:txBody>
+          <a:bodyPr/>
+          <a:lstStyle/>
+          <a:p>
+            <a:r>
+              <a:rPr lang="de-DE" dirty="0" smtClean="0"/>
+              <a:t>Ausblick</a:t>
+            </a:r>
+            <a:endParaRPr lang="de-DE" sz="1400" dirty="0"/>
           </a:p>
         </p:txBody>
       </p:sp>
     </p:spTree>
+    <p:extLst>
+      <p:ext uri="{BB962C8B-B14F-4D97-AF65-F5344CB8AC3E}">
+        <p14:creationId xmlns="" xmlns:p14="http://schemas.microsoft.com/office/powerpoint/2010/main" val="2204816514"/>
+      </p:ext>
+    </p:extLst>
   </p:cSld>
   <p:clrMapOvr>
     <a:masterClrMapping/>
@@ -7845,224 +8786,47 @@
       </p:grpSpPr>
       <p:sp>
         <p:nvSpPr>
-          <p:cNvPr id="2" name="Textplatzhalter 1"/>
-          <p:cNvSpPr>
-            <a:spLocks noGrp="1"/>
-          </p:cNvSpPr>
-          <p:nvPr>
-            <p:ph type="body" sz="quarter" idx="10"/>
-          </p:nvPr>
-        </p:nvSpPr>
-        <p:spPr/>
-        <p:txBody>
-          <a:bodyPr/>
-          <a:lstStyle/>
-          <a:p>
-            <a:r>
-              <a:rPr lang="de-DE" dirty="0" smtClean="0"/>
-              <a:t>Repository etc.</a:t>
-            </a:r>
-          </a:p>
-        </p:txBody>
-      </p:sp>
-      <p:sp>
-        <p:nvSpPr>
-          <p:cNvPr id="3" name="Titel 2"/>
-          <p:cNvSpPr>
-            <a:spLocks noGrp="1"/>
-          </p:cNvSpPr>
-          <p:nvPr>
-            <p:ph type="title"/>
-          </p:nvPr>
+          <p:cNvPr id="5" name="Textfeld 4"/>
+          <p:cNvSpPr txBox="1"/>
+          <p:nvPr/>
         </p:nvSpPr>
         <p:spPr>
           <a:xfrm>
-            <a:off x="250825" y="195526"/>
-            <a:ext cx="8031163" cy="600164"/>
+            <a:off x="2195736" y="2420888"/>
+            <a:ext cx="4752528" cy="1815882"/>
           </a:xfrm>
+          <a:prstGeom prst="rect">
+            <a:avLst/>
+          </a:prstGeom>
+          <a:noFill/>
         </p:spPr>
         <p:txBody>
-          <a:bodyPr/>
+          <a:bodyPr wrap="square" rtlCol="0">
+            <a:spAutoFit/>
+          </a:bodyPr>
           <a:lstStyle/>
           <a:p>
-            <a:r>
-              <a:rPr lang="de-DE" dirty="0" smtClean="0"/>
-              <a:t>Ausblick</a:t>
-            </a:r>
-            <a:br>
-              <a:rPr lang="de-DE" dirty="0" smtClean="0"/>
-            </a:br>
-            <a:r>
-              <a:rPr lang="de-DE" sz="1400" dirty="0" smtClean="0"/>
-              <a:t>Transformationen</a:t>
-            </a:r>
-            <a:endParaRPr lang="de-DE" sz="1400" dirty="0"/>
+            <a:pPr algn="ctr"/>
+            <a:r>
+              <a:rPr lang="de-DE" sz="2800" b="1" dirty="0" smtClean="0"/>
+              <a:t>Vielen Dank für Ihre Aufmerksamkeit!</a:t>
+            </a:r>
+          </a:p>
+          <a:p>
+            <a:pPr algn="ctr"/>
+            <a:endParaRPr lang="de-DE" sz="2800" b="1" dirty="0" smtClean="0"/>
+          </a:p>
+          <a:p>
+            <a:pPr algn="ctr"/>
+            <a:r>
+              <a:rPr lang="de-DE" sz="2800" b="1" dirty="0" smtClean="0"/>
+              <a:t>Ihre Fragen?</a:t>
+            </a:r>
+            <a:endParaRPr lang="de-DE" sz="2800" b="1" dirty="0"/>
           </a:p>
         </p:txBody>
       </p:sp>
     </p:spTree>
-  </p:cSld>
-  <p:clrMapOvr>
-    <a:masterClrMapping/>
-  </p:clrMapOvr>
-  <p:timing>
-    <p:tnLst>
-      <p:par>
-        <p:cTn id="1" dur="indefinite" restart="never" nodeType="tmRoot"/>
-      </p:par>
-    </p:tnLst>
-  </p:timing>
-</p:sld>
-</file>
-
-<file path=ppt/slides/slide39.xml><?xml version="1.0" encoding="utf-8"?>
-<p:sld xmlns:a="http://schemas.openxmlformats.org/drawingml/2006/main" xmlns:r="http://schemas.openxmlformats.org/officeDocument/2006/relationships" xmlns:p="http://schemas.openxmlformats.org/presentationml/2006/main">
-  <p:cSld>
-    <p:spTree>
-      <p:nvGrpSpPr>
-        <p:cNvPr id="1" name=""/>
-        <p:cNvGrpSpPr/>
-        <p:nvPr/>
-      </p:nvGrpSpPr>
-      <p:grpSpPr>
-        <a:xfrm>
-          <a:off x="0" y="0"/>
-          <a:ext cx="0" cy="0"/>
-          <a:chOff x="0" y="0"/>
-          <a:chExt cx="0" cy="0"/>
-        </a:xfrm>
-      </p:grpSpPr>
-      <p:sp>
-        <p:nvSpPr>
-          <p:cNvPr id="2" name="Textplatzhalter 1"/>
-          <p:cNvSpPr>
-            <a:spLocks noGrp="1"/>
-          </p:cNvSpPr>
-          <p:nvPr>
-            <p:ph type="body" sz="quarter" idx="10"/>
-          </p:nvPr>
-        </p:nvSpPr>
-        <p:spPr>
-          <a:xfrm>
-            <a:off x="250824" y="933450"/>
-            <a:ext cx="8031164" cy="4495813"/>
-          </a:xfrm>
-        </p:spPr>
-        <p:txBody>
-          <a:bodyPr/>
-          <a:lstStyle/>
-          <a:p>
-            <a:r>
-              <a:rPr lang="de-DE" dirty="0" smtClean="0"/>
-              <a:t>Mögliche </a:t>
-            </a:r>
-            <a:r>
-              <a:rPr lang="de-DE" dirty="0"/>
-              <a:t>Verbesserungen</a:t>
-            </a:r>
-          </a:p>
-          <a:p>
-            <a:pPr lvl="1"/>
-            <a:r>
-              <a:rPr lang="de-DE" dirty="0"/>
-              <a:t>Intelligenter Model Merger</a:t>
-            </a:r>
-          </a:p>
-          <a:p>
-            <a:pPr lvl="1"/>
-            <a:r>
-              <a:rPr lang="de-DE" dirty="0"/>
-              <a:t>JUNG2 Layouts für große Knoten optimieren</a:t>
-            </a:r>
-          </a:p>
-          <a:p>
-            <a:pPr lvl="1"/>
-            <a:r>
-              <a:rPr lang="de-DE" dirty="0"/>
-              <a:t>Mehrere „Kontaktpunkte“ für Elemente des Graphen definieren</a:t>
-            </a:r>
-          </a:p>
-          <a:p>
-            <a:r>
-              <a:rPr lang="de-DE" dirty="0"/>
-              <a:t>Mögliche Erweiterungen</a:t>
-            </a:r>
-          </a:p>
-          <a:p>
-            <a:pPr lvl="1"/>
-            <a:r>
-              <a:rPr lang="de-DE" dirty="0"/>
-              <a:t>Weitere Filter einbinden (z.B. Filter über aggregierte Attribut Werte)</a:t>
-            </a:r>
-          </a:p>
-          <a:p>
-            <a:pPr lvl="1"/>
-            <a:r>
-              <a:rPr lang="de-DE" dirty="0"/>
-              <a:t>Modifikation des Gesamtmodells in der Matrix View erlauben</a:t>
-            </a:r>
-          </a:p>
-          <a:p>
-            <a:pPr lvl="1"/>
-            <a:r>
-              <a:rPr lang="de-DE" dirty="0"/>
-              <a:t>Lösch und </a:t>
-            </a:r>
-            <a:r>
-              <a:rPr lang="de-DE" dirty="0" err="1"/>
-              <a:t>Merge</a:t>
-            </a:r>
-            <a:r>
-              <a:rPr lang="de-DE" dirty="0"/>
-              <a:t> Operationen implementieren (PSS-IF Core muss erweitert werden)</a:t>
-            </a:r>
-          </a:p>
-          <a:p>
-            <a:endParaRPr lang="de-DE" dirty="0"/>
-          </a:p>
-        </p:txBody>
-      </p:sp>
-      <p:sp>
-        <p:nvSpPr>
-          <p:cNvPr id="3" name="Titel 2"/>
-          <p:cNvSpPr>
-            <a:spLocks noGrp="1"/>
-          </p:cNvSpPr>
-          <p:nvPr>
-            <p:ph type="title"/>
-          </p:nvPr>
-        </p:nvSpPr>
-        <p:spPr>
-          <a:xfrm>
-            <a:off x="250825" y="195526"/>
-            <a:ext cx="8031163" cy="600164"/>
-          </a:xfrm>
-        </p:spPr>
-        <p:txBody>
-          <a:bodyPr/>
-          <a:lstStyle/>
-          <a:p>
-            <a:r>
-              <a:rPr lang="de-DE" dirty="0" smtClean="0"/>
-              <a:t>Ausblick</a:t>
-            </a:r>
-            <a:br>
-              <a:rPr lang="de-DE" dirty="0" smtClean="0"/>
-            </a:br>
-            <a:r>
-              <a:rPr lang="de-DE" sz="1400" dirty="0" smtClean="0"/>
-              <a:t>Visualisierung</a:t>
-            </a:r>
-            <a:endParaRPr lang="de-DE" sz="1400" dirty="0"/>
-          </a:p>
-        </p:txBody>
-      </p:sp>
-    </p:spTree>
-    <p:extLst>
-      <p:ext uri="{BB962C8B-B14F-4D97-AF65-F5344CB8AC3E}">
-        <p14:creationId xmlns:p14="http://schemas.microsoft.com/office/powerpoint/2010/main" xmlns="" val="2204816514"/>
-      </p:ext>
-    </p:extLst>
   </p:cSld>
   <p:clrMapOvr>
     <a:masterClrMapping/>
@@ -8109,47 +8873,71 @@
           <a:bodyPr/>
           <a:lstStyle/>
           <a:p>
-            <a:r>
-              <a:rPr lang="de-DE" dirty="0" smtClean="0"/>
+            <a:pPr>
+              <a:lnSpc>
+                <a:spcPct val="150000"/>
+              </a:lnSpc>
+            </a:pPr>
+            <a:r>
+              <a:rPr lang="de-DE" sz="2000" dirty="0" smtClean="0"/>
               <a:t>Motivation</a:t>
             </a:r>
           </a:p>
           <a:p>
-            <a:r>
-              <a:rPr lang="de-DE" b="1" dirty="0" smtClean="0"/>
+            <a:pPr>
+              <a:lnSpc>
+                <a:spcPct val="150000"/>
+              </a:lnSpc>
+            </a:pPr>
+            <a:r>
+              <a:rPr lang="de-DE" sz="2000" b="1" dirty="0" smtClean="0"/>
               <a:t>Forschungsrichtungen</a:t>
             </a:r>
           </a:p>
           <a:p>
-            <a:r>
-              <a:rPr lang="de-DE" dirty="0" smtClean="0"/>
-              <a:t>Transformationen</a:t>
-            </a:r>
-          </a:p>
-          <a:p>
-            <a:r>
-              <a:rPr lang="de-DE" dirty="0" smtClean="0"/>
-              <a:t>Visualisierung</a:t>
-            </a:r>
-          </a:p>
-          <a:p>
-            <a:r>
-              <a:rPr lang="de-DE" dirty="0" smtClean="0"/>
+            <a:pPr>
+              <a:lnSpc>
+                <a:spcPct val="150000"/>
+              </a:lnSpc>
+            </a:pPr>
+            <a:r>
+              <a:rPr lang="de-DE" sz="2000" dirty="0" smtClean="0"/>
+              <a:t>Transformationen (IDP 1)</a:t>
+            </a:r>
+          </a:p>
+          <a:p>
+            <a:pPr>
+              <a:lnSpc>
+                <a:spcPct val="150000"/>
+              </a:lnSpc>
+            </a:pPr>
+            <a:r>
+              <a:rPr lang="de-DE" sz="2000" dirty="0" smtClean="0"/>
+              <a:t>Visualisierung (IDP 2)</a:t>
+            </a:r>
+          </a:p>
+          <a:p>
+            <a:pPr>
+              <a:lnSpc>
+                <a:spcPct val="150000"/>
+              </a:lnSpc>
+            </a:pPr>
+            <a:r>
+              <a:rPr lang="de-DE" sz="2000" dirty="0" smtClean="0"/>
               <a:t>Ergebnisse</a:t>
             </a:r>
           </a:p>
           <a:p>
-            <a:r>
-              <a:rPr lang="de-DE" dirty="0" smtClean="0"/>
-              <a:t>DEMO</a:t>
-            </a:r>
-          </a:p>
-          <a:p>
-            <a:r>
-              <a:rPr lang="de-DE" dirty="0" smtClean="0"/>
+            <a:pPr>
+              <a:lnSpc>
+                <a:spcPct val="150000"/>
+              </a:lnSpc>
+            </a:pPr>
+            <a:r>
+              <a:rPr lang="de-DE" sz="2000" dirty="0" smtClean="0"/>
               <a:t>Ausblick</a:t>
             </a:r>
-            <a:endParaRPr lang="de-DE" dirty="0"/>
+            <a:endParaRPr lang="de-DE" sz="2000" dirty="0"/>
           </a:p>
         </p:txBody>
       </p:sp>
@@ -8173,69 +8961,6 @@
               <a:t>Agenda</a:t>
             </a:r>
             <a:endParaRPr lang="de-DE" dirty="0"/>
-          </a:p>
-        </p:txBody>
-      </p:sp>
-    </p:spTree>
-  </p:cSld>
-  <p:clrMapOvr>
-    <a:masterClrMapping/>
-  </p:clrMapOvr>
-  <p:timing>
-    <p:tnLst>
-      <p:par>
-        <p:cTn id="1" dur="indefinite" restart="never" nodeType="tmRoot"/>
-      </p:par>
-    </p:tnLst>
-  </p:timing>
-</p:sld>
-</file>
-
-<file path=ppt/slides/slide40.xml><?xml version="1.0" encoding="utf-8"?>
-<p:sld xmlns:a="http://schemas.openxmlformats.org/drawingml/2006/main" xmlns:r="http://schemas.openxmlformats.org/officeDocument/2006/relationships" xmlns:p="http://schemas.openxmlformats.org/presentationml/2006/main">
-  <p:cSld>
-    <p:spTree>
-      <p:nvGrpSpPr>
-        <p:cNvPr id="1" name=""/>
-        <p:cNvGrpSpPr/>
-        <p:nvPr/>
-      </p:nvGrpSpPr>
-      <p:grpSpPr>
-        <a:xfrm>
-          <a:off x="0" y="0"/>
-          <a:ext cx="0" cy="0"/>
-          <a:chOff x="0" y="0"/>
-          <a:chExt cx="0" cy="0"/>
-        </a:xfrm>
-      </p:grpSpPr>
-      <p:sp>
-        <p:nvSpPr>
-          <p:cNvPr id="5" name="Textfeld 4"/>
-          <p:cNvSpPr txBox="1"/>
-          <p:nvPr/>
-        </p:nvSpPr>
-        <p:spPr>
-          <a:xfrm>
-            <a:off x="2195736" y="2420888"/>
-            <a:ext cx="4752528" cy="1200329"/>
-          </a:xfrm>
-          <a:prstGeom prst="rect">
-            <a:avLst/>
-          </a:prstGeom>
-          <a:noFill/>
-        </p:spPr>
-        <p:txBody>
-          <a:bodyPr wrap="square" rtlCol="0">
-            <a:spAutoFit/>
-          </a:bodyPr>
-          <a:lstStyle/>
-          <a:p>
-            <a:pPr algn="ctr"/>
-            <a:r>
-              <a:rPr lang="de-DE" sz="7200" b="1" dirty="0" smtClean="0"/>
-              <a:t>THX</a:t>
-            </a:r>
-            <a:endParaRPr lang="de-DE" sz="7200" b="1" dirty="0"/>
           </a:p>
         </p:txBody>
       </p:sp>
@@ -8310,8 +9035,8 @@
         </p:blipFill>
         <p:spPr>
           <a:xfrm>
-            <a:off x="971600" y="3566822"/>
-            <a:ext cx="5760000" cy="2100374"/>
+            <a:off x="1000100" y="3929066"/>
+            <a:ext cx="5289551" cy="1928826"/>
           </a:xfrm>
           <a:prstGeom prst="rect">
             <a:avLst/>
@@ -8334,14 +9059,82 @@
         </p:blipFill>
         <p:spPr>
           <a:xfrm>
-            <a:off x="971600" y="1124744"/>
-            <a:ext cx="5760000" cy="2278882"/>
+            <a:off x="971601" y="1080519"/>
+            <a:ext cx="5289550" cy="2092754"/>
           </a:xfrm>
           <a:prstGeom prst="rect">
             <a:avLst/>
           </a:prstGeom>
         </p:spPr>
       </p:pic>
+      <p:sp>
+        <p:nvSpPr>
+          <p:cNvPr id="6" name="TextBox 5"/>
+          <p:cNvSpPr txBox="1"/>
+          <p:nvPr/>
+        </p:nvSpPr>
+        <p:spPr>
+          <a:xfrm>
+            <a:off x="971600" y="642918"/>
+            <a:ext cx="7100862" cy="400110"/>
+          </a:xfrm>
+          <a:prstGeom prst="rect">
+            <a:avLst/>
+          </a:prstGeom>
+          <a:noFill/>
+        </p:spPr>
+        <p:txBody>
+          <a:bodyPr wrap="square" rtlCol="0">
+            <a:spAutoFit/>
+          </a:bodyPr>
+          <a:lstStyle/>
+          <a:p>
+            <a:r>
+              <a:rPr lang="de-DE" dirty="0" smtClean="0"/>
+              <a:t>IDP 1: Modellbasierte </a:t>
+            </a:r>
+            <a:r>
+              <a:rPr lang="de-DE" dirty="0" smtClean="0"/>
+              <a:t>Transformationen für PSS</a:t>
+            </a:r>
+            <a:endParaRPr lang="bg-BG" dirty="0"/>
+          </a:p>
+        </p:txBody>
+      </p:sp>
+      <p:sp>
+        <p:nvSpPr>
+          <p:cNvPr id="7" name="TextBox 6"/>
+          <p:cNvSpPr txBox="1"/>
+          <p:nvPr/>
+        </p:nvSpPr>
+        <p:spPr>
+          <a:xfrm>
+            <a:off x="1000100" y="3214686"/>
+            <a:ext cx="7100862" cy="707886"/>
+          </a:xfrm>
+          <a:prstGeom prst="rect">
+            <a:avLst/>
+          </a:prstGeom>
+          <a:noFill/>
+        </p:spPr>
+        <p:txBody>
+          <a:bodyPr wrap="square" rtlCol="0">
+            <a:spAutoFit/>
+          </a:bodyPr>
+          <a:lstStyle/>
+          <a:p>
+            <a:r>
+              <a:rPr lang="de-DE" dirty="0" smtClean="0"/>
+              <a:t>IDP 2: </a:t>
+            </a:r>
+            <a:r>
+              <a:rPr lang="de-DE" dirty="0" smtClean="0"/>
+              <a:t>Interdisziplinäre Nutzung von Modellinformationen in der Entwicklung von PSS</a:t>
+            </a:r>
+            <a:endParaRPr lang="bg-BG" dirty="0"/>
+          </a:p>
+        </p:txBody>
+      </p:sp>
     </p:spTree>
   </p:cSld>
   <p:clrMapOvr>
@@ -8376,67 +9169,6 @@
       </p:grpSpPr>
       <p:sp>
         <p:nvSpPr>
-          <p:cNvPr id="2" name="Textplatzhalter 1"/>
-          <p:cNvSpPr>
-            <a:spLocks noGrp="1"/>
-          </p:cNvSpPr>
-          <p:nvPr>
-            <p:ph type="body" sz="quarter" idx="10"/>
-          </p:nvPr>
-        </p:nvSpPr>
-        <p:spPr/>
-        <p:txBody>
-          <a:bodyPr/>
-          <a:lstStyle/>
-          <a:p>
-            <a:r>
-              <a:rPr lang="de-DE" dirty="0" smtClean="0"/>
-              <a:t>Motivation</a:t>
-            </a:r>
-          </a:p>
-          <a:p>
-            <a:r>
-              <a:rPr lang="de-DE" dirty="0" smtClean="0"/>
-              <a:t>Forschungsrichtungen</a:t>
-            </a:r>
-          </a:p>
-          <a:p>
-            <a:r>
-              <a:rPr lang="de-DE" b="1" dirty="0" smtClean="0"/>
-              <a:t>Transformationen</a:t>
-            </a:r>
-          </a:p>
-          <a:p>
-            <a:r>
-              <a:rPr lang="de-DE" dirty="0" smtClean="0"/>
-              <a:t>Visualisierung</a:t>
-            </a:r>
-          </a:p>
-          <a:p>
-            <a:r>
-              <a:rPr lang="de-DE" dirty="0" smtClean="0"/>
-              <a:t>Ergebnisse</a:t>
-            </a:r>
-          </a:p>
-          <a:p>
-            <a:r>
-              <a:rPr lang="de-DE" dirty="0" smtClean="0"/>
-              <a:t>DEMO</a:t>
-            </a:r>
-          </a:p>
-          <a:p>
-            <a:r>
-              <a:rPr lang="de-DE" dirty="0" smtClean="0"/>
-              <a:t>Ausblick</a:t>
-            </a:r>
-          </a:p>
-          <a:p>
-            <a:endParaRPr lang="de-DE" dirty="0"/>
-          </a:p>
-        </p:txBody>
-      </p:sp>
-      <p:sp>
-        <p:nvSpPr>
           <p:cNvPr id="3" name="Titel 2"/>
           <p:cNvSpPr>
             <a:spLocks noGrp="1"/>
@@ -8455,6 +9187,375 @@
               <a:t>Agenda</a:t>
             </a:r>
             <a:endParaRPr lang="de-DE" dirty="0"/>
+          </a:p>
+        </p:txBody>
+      </p:sp>
+      <p:sp>
+        <p:nvSpPr>
+          <p:cNvPr id="5" name="Textplatzhalter 1"/>
+          <p:cNvSpPr txBox="1">
+            <a:spLocks/>
+          </p:cNvSpPr>
+          <p:nvPr/>
+        </p:nvSpPr>
+        <p:spPr>
+          <a:xfrm>
+            <a:off x="403224" y="1085850"/>
+            <a:ext cx="5329239" cy="4495813"/>
+          </a:xfrm>
+          <a:prstGeom prst="rect">
+            <a:avLst/>
+          </a:prstGeom>
+        </p:spPr>
+        <p:txBody>
+          <a:bodyPr/>
+          <a:lstStyle/>
+          <a:p>
+            <a:pPr marL="266700" marR="0" lvl="0" indent="-266700" algn="l" defTabSz="914400" rtl="0" eaLnBrk="1" fontAlgn="base" latinLnBrk="0" hangingPunct="1">
+              <a:lnSpc>
+                <a:spcPct val="150000"/>
+              </a:lnSpc>
+              <a:spcBef>
+                <a:spcPct val="20000"/>
+              </a:spcBef>
+              <a:spcAft>
+                <a:spcPct val="0"/>
+              </a:spcAft>
+              <a:buClr>
+                <a:srgbClr val="0065BD"/>
+              </a:buClr>
+              <a:buSzTx/>
+              <a:buFont typeface="Arial" charset="0"/>
+              <a:buChar char="●"/>
+              <a:tabLst/>
+              <a:defRPr/>
+            </a:pPr>
+            <a:r>
+              <a:rPr kumimoji="0" lang="de-DE" sz="2000" b="0" i="0" u="none" strike="noStrike" kern="0" cap="none" spc="0" normalizeH="0" baseline="0" noProof="0" dirty="0" smtClean="0">
+                <a:ln>
+                  <a:noFill/>
+                </a:ln>
+                <a:solidFill>
+                  <a:schemeClr val="tx1"/>
+                </a:solidFill>
+                <a:effectLst/>
+                <a:uLnTx/>
+                <a:uFillTx/>
+                <a:latin typeface="Arial" charset="0"/>
+                <a:ea typeface="+mn-ea"/>
+                <a:cs typeface="+mn-cs"/>
+              </a:rPr>
+              <a:t>Motivation</a:t>
+            </a:r>
+          </a:p>
+          <a:p>
+            <a:pPr marL="266700" marR="0" lvl="0" indent="-266700" algn="l" defTabSz="914400" rtl="0" eaLnBrk="1" fontAlgn="base" latinLnBrk="0" hangingPunct="1">
+              <a:lnSpc>
+                <a:spcPct val="150000"/>
+              </a:lnSpc>
+              <a:spcBef>
+                <a:spcPct val="20000"/>
+              </a:spcBef>
+              <a:spcAft>
+                <a:spcPct val="0"/>
+              </a:spcAft>
+              <a:buClr>
+                <a:srgbClr val="0065BD"/>
+              </a:buClr>
+              <a:buSzTx/>
+              <a:buFont typeface="Arial" charset="0"/>
+              <a:buChar char="●"/>
+              <a:tabLst/>
+              <a:defRPr/>
+            </a:pPr>
+            <a:r>
+              <a:rPr kumimoji="0" lang="de-DE" sz="2000" i="0" u="none" strike="noStrike" kern="0" cap="none" spc="0" normalizeH="0" baseline="0" noProof="0" dirty="0" smtClean="0">
+                <a:ln>
+                  <a:noFill/>
+                </a:ln>
+                <a:solidFill>
+                  <a:schemeClr val="tx1"/>
+                </a:solidFill>
+                <a:effectLst/>
+                <a:uLnTx/>
+                <a:uFillTx/>
+                <a:latin typeface="Arial" charset="0"/>
+                <a:ea typeface="+mn-ea"/>
+                <a:cs typeface="+mn-cs"/>
+              </a:rPr>
+              <a:t>Forschungsrichtungen</a:t>
+            </a:r>
+            <a:endParaRPr kumimoji="0" lang="de-DE" sz="2000" b="1" i="0" u="none" strike="noStrike" kern="0" cap="none" spc="0" normalizeH="0" baseline="0" noProof="0" dirty="0" smtClean="0">
+              <a:ln>
+                <a:noFill/>
+              </a:ln>
+              <a:solidFill>
+                <a:schemeClr val="tx1"/>
+              </a:solidFill>
+              <a:effectLst/>
+              <a:uLnTx/>
+              <a:uFillTx/>
+              <a:latin typeface="Arial" charset="0"/>
+              <a:ea typeface="+mn-ea"/>
+              <a:cs typeface="+mn-cs"/>
+            </a:endParaRPr>
+          </a:p>
+          <a:p>
+            <a:pPr marL="266700" marR="0" lvl="0" indent="-266700" algn="l" defTabSz="914400" rtl="0" eaLnBrk="1" fontAlgn="base" latinLnBrk="0" hangingPunct="1">
+              <a:lnSpc>
+                <a:spcPct val="150000"/>
+              </a:lnSpc>
+              <a:spcBef>
+                <a:spcPct val="20000"/>
+              </a:spcBef>
+              <a:spcAft>
+                <a:spcPct val="0"/>
+              </a:spcAft>
+              <a:buClr>
+                <a:srgbClr val="0065BD"/>
+              </a:buClr>
+              <a:buSzTx/>
+              <a:buFont typeface="Arial" charset="0"/>
+              <a:buChar char="●"/>
+              <a:tabLst/>
+              <a:defRPr/>
+            </a:pPr>
+            <a:r>
+              <a:rPr kumimoji="0" lang="de-DE" sz="2000" b="1" i="0" u="none" strike="noStrike" kern="0" cap="none" spc="0" normalizeH="0" baseline="0" noProof="0" dirty="0" smtClean="0">
+                <a:ln>
+                  <a:noFill/>
+                </a:ln>
+                <a:solidFill>
+                  <a:schemeClr val="tx1"/>
+                </a:solidFill>
+                <a:effectLst/>
+                <a:uLnTx/>
+                <a:uFillTx/>
+                <a:latin typeface="Arial" charset="0"/>
+                <a:ea typeface="+mn-ea"/>
+                <a:cs typeface="+mn-cs"/>
+              </a:rPr>
+              <a:t>Transformationen (IDP 1)</a:t>
+            </a:r>
+            <a:endParaRPr lang="de-DE" b="1" kern="0" noProof="0" dirty="0" smtClean="0">
+              <a:solidFill>
+                <a:schemeClr val="tx1"/>
+              </a:solidFill>
+            </a:endParaRPr>
+          </a:p>
+          <a:p>
+            <a:pPr marL="723900" lvl="1" indent="-266700">
+              <a:spcBef>
+                <a:spcPct val="20000"/>
+              </a:spcBef>
+              <a:buClr>
+                <a:srgbClr val="0065BD"/>
+              </a:buClr>
+              <a:buFont typeface="Arial" charset="0"/>
+              <a:buChar char="●"/>
+            </a:pPr>
+            <a:r>
+              <a:rPr lang="de-DE" sz="1800" dirty="0" smtClean="0"/>
+              <a:t>Ziele</a:t>
+            </a:r>
+          </a:p>
+          <a:p>
+            <a:pPr marL="723900" lvl="1" indent="-266700">
+              <a:spcBef>
+                <a:spcPct val="20000"/>
+              </a:spcBef>
+              <a:buClr>
+                <a:srgbClr val="0065BD"/>
+              </a:buClr>
+              <a:buFont typeface="Arial" charset="0"/>
+              <a:buChar char="●"/>
+            </a:pPr>
+            <a:r>
+              <a:rPr lang="de-DE" sz="1800" dirty="0" smtClean="0"/>
+              <a:t>Lösungsalternativen</a:t>
+            </a:r>
+          </a:p>
+          <a:p>
+            <a:pPr marL="723900" lvl="1" indent="-266700">
+              <a:spcBef>
+                <a:spcPct val="20000"/>
+              </a:spcBef>
+              <a:buClr>
+                <a:srgbClr val="0065BD"/>
+              </a:buClr>
+              <a:buFont typeface="Arial" charset="0"/>
+              <a:buChar char="●"/>
+            </a:pPr>
+            <a:r>
+              <a:rPr lang="de-DE" sz="1800" dirty="0" smtClean="0"/>
+              <a:t>Diskussion </a:t>
+            </a:r>
+            <a:r>
+              <a:rPr lang="de-DE" sz="1800" dirty="0" smtClean="0"/>
+              <a:t>&amp; </a:t>
+            </a:r>
+            <a:r>
+              <a:rPr lang="de-DE" sz="1800" dirty="0" smtClean="0"/>
+              <a:t>Entscheidung</a:t>
+            </a:r>
+          </a:p>
+          <a:p>
+            <a:pPr marL="723900" lvl="1" indent="-266700">
+              <a:spcBef>
+                <a:spcPct val="20000"/>
+              </a:spcBef>
+              <a:buClr>
+                <a:srgbClr val="0065BD"/>
+              </a:buClr>
+              <a:buFont typeface="Arial" charset="0"/>
+              <a:buChar char="●"/>
+            </a:pPr>
+            <a:r>
+              <a:rPr lang="de-DE" sz="1800" dirty="0" smtClean="0"/>
+              <a:t>Implementierung</a:t>
+            </a:r>
+            <a:endParaRPr kumimoji="0" lang="de-DE" sz="1800" b="0" i="0" u="none" strike="noStrike" kern="0" cap="none" spc="0" normalizeH="0" baseline="0" noProof="0" dirty="0" smtClean="0">
+              <a:ln>
+                <a:noFill/>
+              </a:ln>
+              <a:solidFill>
+                <a:schemeClr val="tx1"/>
+              </a:solidFill>
+              <a:effectLst/>
+              <a:uLnTx/>
+              <a:uFillTx/>
+              <a:latin typeface="Arial" charset="0"/>
+              <a:ea typeface="+mn-ea"/>
+              <a:cs typeface="+mn-cs"/>
+            </a:endParaRPr>
+          </a:p>
+          <a:p>
+            <a:pPr marL="266700" marR="0" lvl="0" indent="-266700" algn="l" defTabSz="914400" rtl="0" eaLnBrk="1" fontAlgn="base" latinLnBrk="0" hangingPunct="1">
+              <a:lnSpc>
+                <a:spcPct val="150000"/>
+              </a:lnSpc>
+              <a:spcBef>
+                <a:spcPct val="20000"/>
+              </a:spcBef>
+              <a:spcAft>
+                <a:spcPct val="0"/>
+              </a:spcAft>
+              <a:buClr>
+                <a:srgbClr val="0065BD"/>
+              </a:buClr>
+              <a:buSzTx/>
+              <a:buFont typeface="Arial" charset="0"/>
+              <a:buChar char="●"/>
+              <a:tabLst/>
+              <a:defRPr/>
+            </a:pPr>
+            <a:r>
+              <a:rPr kumimoji="0" lang="de-DE" sz="2000" b="0" i="0" u="none" strike="noStrike" kern="0" cap="none" spc="0" normalizeH="0" baseline="0" noProof="0" dirty="0" smtClean="0">
+                <a:ln>
+                  <a:noFill/>
+                </a:ln>
+                <a:solidFill>
+                  <a:schemeClr val="tx1"/>
+                </a:solidFill>
+                <a:effectLst/>
+                <a:uLnTx/>
+                <a:uFillTx/>
+                <a:latin typeface="Arial" charset="0"/>
+                <a:ea typeface="+mn-ea"/>
+                <a:cs typeface="+mn-cs"/>
+              </a:rPr>
+              <a:t>Visualisierung (IDP 2)</a:t>
+            </a:r>
+          </a:p>
+          <a:p>
+            <a:pPr marL="266700" marR="0" lvl="0" indent="-266700" algn="l" defTabSz="914400" rtl="0" eaLnBrk="1" fontAlgn="base" latinLnBrk="0" hangingPunct="1">
+              <a:lnSpc>
+                <a:spcPct val="150000"/>
+              </a:lnSpc>
+              <a:spcBef>
+                <a:spcPct val="20000"/>
+              </a:spcBef>
+              <a:spcAft>
+                <a:spcPct val="0"/>
+              </a:spcAft>
+              <a:buClr>
+                <a:srgbClr val="0065BD"/>
+              </a:buClr>
+              <a:buSzTx/>
+              <a:buFont typeface="Arial" charset="0"/>
+              <a:buChar char="●"/>
+              <a:tabLst/>
+              <a:defRPr/>
+            </a:pPr>
+            <a:r>
+              <a:rPr kumimoji="0" lang="de-DE" sz="2000" b="0" i="0" u="none" strike="noStrike" kern="0" cap="none" spc="0" normalizeH="0" baseline="0" noProof="0" dirty="0" smtClean="0">
+                <a:ln>
+                  <a:noFill/>
+                </a:ln>
+                <a:solidFill>
+                  <a:schemeClr val="tx1"/>
+                </a:solidFill>
+                <a:effectLst/>
+                <a:uLnTx/>
+                <a:uFillTx/>
+                <a:latin typeface="Arial" charset="0"/>
+                <a:ea typeface="+mn-ea"/>
+                <a:cs typeface="+mn-cs"/>
+              </a:rPr>
+              <a:t>Ergebnisse</a:t>
+            </a:r>
+          </a:p>
+          <a:p>
+            <a:pPr marL="266700" marR="0" lvl="0" indent="-266700" algn="l" defTabSz="914400" rtl="0" eaLnBrk="1" fontAlgn="base" latinLnBrk="0" hangingPunct="1">
+              <a:lnSpc>
+                <a:spcPct val="150000"/>
+              </a:lnSpc>
+              <a:spcBef>
+                <a:spcPct val="20000"/>
+              </a:spcBef>
+              <a:spcAft>
+                <a:spcPct val="0"/>
+              </a:spcAft>
+              <a:buClr>
+                <a:srgbClr val="0065BD"/>
+              </a:buClr>
+              <a:buSzTx/>
+              <a:buFont typeface="Arial" charset="0"/>
+              <a:buChar char="●"/>
+              <a:tabLst/>
+              <a:defRPr/>
+            </a:pPr>
+            <a:r>
+              <a:rPr kumimoji="0" lang="de-DE" sz="2000" b="0" i="0" u="none" strike="noStrike" kern="0" cap="none" spc="0" normalizeH="0" baseline="0" noProof="0" dirty="0" smtClean="0">
+                <a:ln>
+                  <a:noFill/>
+                </a:ln>
+                <a:solidFill>
+                  <a:schemeClr val="tx1"/>
+                </a:solidFill>
+                <a:effectLst/>
+                <a:uLnTx/>
+                <a:uFillTx/>
+                <a:latin typeface="Arial" charset="0"/>
+                <a:ea typeface="+mn-ea"/>
+                <a:cs typeface="+mn-cs"/>
+              </a:rPr>
+              <a:t>Ausblick</a:t>
+            </a:r>
+            <a:endParaRPr kumimoji="0" lang="de-DE" sz="2000" b="0" i="0" u="none" strike="noStrike" kern="0" cap="none" spc="0" normalizeH="0" baseline="0" noProof="0" dirty="0">
+              <a:ln>
+                <a:noFill/>
+              </a:ln>
+              <a:solidFill>
+                <a:schemeClr val="tx1"/>
+              </a:solidFill>
+              <a:effectLst/>
+              <a:uLnTx/>
+              <a:uFillTx/>
+              <a:latin typeface="Arial" charset="0"/>
+              <a:ea typeface="+mn-ea"/>
+              <a:cs typeface="+mn-cs"/>
+            </a:endParaRPr>
           </a:p>
         </p:txBody>
       </p:sp>
@@ -8500,32 +9601,73 @@
             <p:ph type="body" sz="quarter" idx="10"/>
           </p:nvPr>
         </p:nvSpPr>
-        <p:spPr/>
+        <p:spPr>
+          <a:xfrm>
+            <a:off x="250824" y="3290905"/>
+            <a:ext cx="8031164" cy="4495813"/>
+          </a:xfrm>
+        </p:spPr>
         <p:txBody>
           <a:bodyPr/>
           <a:lstStyle/>
           <a:p>
             <a:r>
               <a:rPr lang="de-DE" dirty="0" smtClean="0"/>
-              <a:t>Ziele</a:t>
-            </a:r>
-          </a:p>
-          <a:p>
-            <a:r>
-              <a:rPr lang="de-DE" dirty="0" smtClean="0"/>
-              <a:t>Lösungsalternativen</a:t>
-            </a:r>
-          </a:p>
-          <a:p>
-            <a:r>
-              <a:rPr lang="de-DE" dirty="0" smtClean="0"/>
-              <a:t>Diskussion &amp; Entscheidung</a:t>
-            </a:r>
-          </a:p>
-          <a:p>
-            <a:r>
-              <a:rPr lang="de-DE" dirty="0" smtClean="0"/>
-              <a:t>Implementierung</a:t>
+              <a:t>Transformation von Modellen zwischen jeweils zwei </a:t>
+            </a:r>
+            <a:r>
+              <a:rPr lang="de-DE" dirty="0" smtClean="0"/>
+              <a:t>Sprachen</a:t>
+            </a:r>
+          </a:p>
+          <a:p>
+            <a:r>
+              <a:rPr lang="de-DE" dirty="0" smtClean="0"/>
+              <a:t>Möglichst informationsverlust-frei</a:t>
+            </a:r>
+            <a:endParaRPr lang="de-DE" dirty="0" smtClean="0"/>
+          </a:p>
+          <a:p>
+            <a:r>
+              <a:rPr lang="de-DE" dirty="0" smtClean="0"/>
+              <a:t>Proof-of-Concept (PoC) Implementierung</a:t>
+            </a:r>
+          </a:p>
+          <a:p>
+            <a:r>
+              <a:rPr lang="de-DE" dirty="0" smtClean="0"/>
+              <a:t>4 Beispielsprachen:</a:t>
+            </a:r>
+          </a:p>
+          <a:p>
+            <a:pPr lvl="1"/>
+            <a:r>
+              <a:rPr lang="de-DE" dirty="0" smtClean="0"/>
+              <a:t>Ereignisgesteuerte Prozess-Ketten (EPK)</a:t>
+            </a:r>
+            <a:endParaRPr lang="de-DE" dirty="0" smtClean="0"/>
+          </a:p>
+          <a:p>
+            <a:pPr lvl="1"/>
+            <a:r>
+              <a:rPr lang="de-DE" dirty="0" smtClean="0"/>
+              <a:t>Business Process Modelling Notation (BPMN)</a:t>
+            </a:r>
+            <a:endParaRPr lang="de-DE" dirty="0" smtClean="0"/>
+          </a:p>
+          <a:p>
+            <a:pPr lvl="1"/>
+            <a:r>
+              <a:rPr lang="de-DE" dirty="0" smtClean="0"/>
+              <a:t>Umsatzorientierte Funktions-Modellierung (UFM)</a:t>
+            </a:r>
+            <a:endParaRPr lang="de-DE" dirty="0" smtClean="0"/>
+          </a:p>
+          <a:p>
+            <a:pPr lvl="1"/>
+            <a:r>
+              <a:rPr lang="de-DE" dirty="0" smtClean="0"/>
+              <a:t>Systems Modelling Language for Mechatronics (SysML4Mechatronics)</a:t>
             </a:r>
             <a:endParaRPr lang="de-DE" dirty="0"/>
           </a:p>
@@ -8541,19 +9683,44 @@
             <p:ph type="title"/>
           </p:nvPr>
         </p:nvSpPr>
-        <p:spPr/>
+        <p:spPr>
+          <a:xfrm>
+            <a:off x="250825" y="195526"/>
+            <a:ext cx="8031163" cy="384721"/>
+          </a:xfrm>
+        </p:spPr>
         <p:txBody>
           <a:bodyPr/>
           <a:lstStyle/>
           <a:p>
             <a:r>
               <a:rPr lang="de-DE" dirty="0" smtClean="0"/>
-              <a:t>Transformationen</a:t>
+              <a:t>Transformationen (IDP 1) – Ziele</a:t>
             </a:r>
             <a:endParaRPr lang="de-DE" dirty="0"/>
           </a:p>
         </p:txBody>
       </p:sp>
+      <p:graphicFrame>
+        <p:nvGraphicFramePr>
+          <p:cNvPr id="3078" name="Object 6"/>
+          <p:cNvGraphicFramePr>
+            <a:graphicFrameLocks noChangeAspect="1"/>
+          </p:cNvGraphicFramePr>
+          <p:nvPr/>
+        </p:nvGraphicFramePr>
+        <p:xfrm>
+          <a:off x="1428728" y="928670"/>
+          <a:ext cx="6379312" cy="2109792"/>
+        </p:xfrm>
+        <a:graphic>
+          <a:graphicData uri="http://schemas.openxmlformats.org/presentationml/2006/ole">
+            <p:oleObj spid="_x0000_s3078" name="Visio" r:id="rId3" imgW="4867253" imgH="1609661" progId="Visio.Drawing.15">
+              <p:embed/>
+            </p:oleObj>
+          </a:graphicData>
+        </a:graphic>
+      </p:graphicFrame>
     </p:spTree>
   </p:cSld>
   <p:clrMapOvr>
@@ -8596,56 +9763,60 @@
             <p:ph type="body" sz="quarter" idx="10"/>
           </p:nvPr>
         </p:nvSpPr>
-        <p:spPr/>
+        <p:spPr>
+          <a:xfrm>
+            <a:off x="250824" y="3505219"/>
+            <a:ext cx="8031164" cy="4495813"/>
+          </a:xfrm>
+        </p:spPr>
         <p:txBody>
           <a:bodyPr/>
           <a:lstStyle/>
           <a:p>
             <a:r>
               <a:rPr lang="de-DE" dirty="0" smtClean="0"/>
-              <a:t>Transformation von Modellen zwischen jeweils zwei Sprachen</a:t>
-            </a:r>
-          </a:p>
-          <a:p>
-            <a:r>
-              <a:rPr lang="de-DE" dirty="0" smtClean="0"/>
-              <a:t>Proof-of-Concept (PoC) Implementierung</a:t>
-            </a:r>
-          </a:p>
-          <a:p>
-            <a:r>
-              <a:rPr lang="de-DE" dirty="0" smtClean="0"/>
-              <a:t>4 Beispielsprachen:</a:t>
-            </a:r>
+              <a:t>Direkten Transformationen (kein Zwischenformat)</a:t>
+            </a:r>
+            <a:endParaRPr lang="de-DE" dirty="0" smtClean="0"/>
           </a:p>
           <a:p>
             <a:pPr lvl="1"/>
             <a:r>
               <a:rPr lang="de-DE" dirty="0" smtClean="0"/>
-              <a:t>EPK</a:t>
+              <a:t>Syntax-abhängig</a:t>
             </a:r>
           </a:p>
           <a:p>
             <a:pPr lvl="1"/>
             <a:r>
               <a:rPr lang="de-DE" dirty="0" smtClean="0"/>
-              <a:t>BPMN</a:t>
-            </a:r>
+              <a:t>Syntax-unabhängig</a:t>
+            </a:r>
+          </a:p>
+          <a:p>
+            <a:r>
+              <a:rPr lang="de-DE" dirty="0" smtClean="0"/>
+              <a:t>Indirekten</a:t>
+            </a:r>
+            <a:r>
+              <a:rPr lang="de-DE" dirty="0" smtClean="0"/>
+              <a:t> Transformationen (mit Zwischenformat)</a:t>
+            </a:r>
+            <a:endParaRPr lang="de-DE" dirty="0" smtClean="0"/>
           </a:p>
           <a:p>
             <a:pPr lvl="1"/>
             <a:r>
               <a:rPr lang="de-DE" dirty="0" smtClean="0"/>
-              <a:t>UFM</a:t>
+              <a:t>Fixes Schema für das Zwischenformat</a:t>
             </a:r>
           </a:p>
           <a:p>
             <a:pPr lvl="1"/>
             <a:r>
               <a:rPr lang="de-DE" dirty="0" smtClean="0"/>
-              <a:t>SysML4Mechatronics</a:t>
-            </a:r>
-            <a:endParaRPr lang="de-DE" dirty="0"/>
+              <a:t>Variables Schema für das Zwischenformat</a:t>
+            </a:r>
           </a:p>
         </p:txBody>
       </p:sp>
@@ -8659,14 +9830,27 @@
             <p:ph type="title"/>
           </p:nvPr>
         </p:nvSpPr>
-        <p:spPr/>
+        <p:spPr>
+          <a:xfrm>
+            <a:off x="250825" y="195526"/>
+            <a:ext cx="8031163" cy="384721"/>
+          </a:xfrm>
+        </p:spPr>
         <p:txBody>
           <a:bodyPr/>
           <a:lstStyle/>
           <a:p>
             <a:r>
               <a:rPr lang="de-DE" dirty="0" smtClean="0"/>
-              <a:t>Ziele</a:t>
+              <a:t>Transformationen (IDP 1) </a:t>
+            </a:r>
+            <a:r>
+              <a:rPr lang="de-DE" dirty="0" smtClean="0"/>
+              <a:t>– </a:t>
+            </a:r>
+            <a:r>
+              <a:rPr lang="de-DE" dirty="0" smtClean="0"/>
+              <a:t>Lösungsmöglichkeiten</a:t>
             </a:r>
             <a:endParaRPr lang="de-DE" dirty="0"/>
           </a:p>
@@ -8674,19 +9858,19 @@
       </p:sp>
       <p:graphicFrame>
         <p:nvGraphicFramePr>
-          <p:cNvPr id="3074" name="Object 2"/>
+          <p:cNvPr id="21505" name="Object 1"/>
           <p:cNvGraphicFramePr>
             <a:graphicFrameLocks noChangeAspect="1"/>
           </p:cNvGraphicFramePr>
           <p:nvPr/>
         </p:nvGraphicFramePr>
         <p:xfrm>
-          <a:off x="1357290" y="3786190"/>
-          <a:ext cx="6324600" cy="2009775"/>
+          <a:off x="785786" y="714356"/>
+          <a:ext cx="7711298" cy="2500330"/>
         </p:xfrm>
         <a:graphic>
           <a:graphicData uri="http://schemas.openxmlformats.org/presentationml/2006/ole">
-            <p:oleObj spid="_x0000_s3076" name="Visio" r:id="rId3" imgW="6324703" imgH="2009711" progId="Visio.Drawing.15">
+            <p:oleObj spid="_x0000_s21505" name="Visio" r:id="rId3" imgW="6286384" imgH="2038363" progId="Visio.Drawing.15">
               <p:embed/>
             </p:oleObj>
           </a:graphicData>
@@ -8726,7 +9910,7 @@
       </p:grpSpPr>
       <p:sp>
         <p:nvSpPr>
-          <p:cNvPr id="2" name="Textplatzhalter 1"/>
+          <p:cNvPr id="2" name="Text Placeholder 1"/>
           <p:cNvSpPr>
             <a:spLocks noGrp="1"/>
           </p:cNvSpPr>
@@ -8734,82 +9918,61 @@
             <p:ph type="body" sz="quarter" idx="10"/>
           </p:nvPr>
         </p:nvSpPr>
-        <p:spPr/>
+        <p:spPr>
+          <a:xfrm>
+            <a:off x="250824" y="933450"/>
+            <a:ext cx="8393142" cy="4495813"/>
+          </a:xfrm>
+        </p:spPr>
         <p:txBody>
           <a:bodyPr/>
           <a:lstStyle/>
           <a:p>
-            <a:r>
-              <a:rPr lang="de-DE" dirty="0" smtClean="0"/>
-              <a:t>Allgemein: 4 Lösungsmöglichkeiten</a:t>
-            </a:r>
-            <a:endParaRPr lang="de-DE" dirty="0"/>
-          </a:p>
-          <a:p>
-            <a:r>
-              <a:rPr lang="de-DE" dirty="0" smtClean="0"/>
-              <a:t>Ergeben sich aus zwei Dimensionen</a:t>
-            </a:r>
-          </a:p>
-          <a:p>
-            <a:pPr lvl="1"/>
-            <a:r>
-              <a:rPr lang="de-DE" dirty="0" smtClean="0"/>
-              <a:t>Direkte Transformation</a:t>
-            </a:r>
-          </a:p>
-          <a:p>
-            <a:pPr lvl="1"/>
-            <a:r>
-              <a:rPr lang="de-DE" dirty="0" smtClean="0"/>
-              <a:t>Indirekte Transformation</a:t>
-            </a:r>
-          </a:p>
-          <a:p>
-            <a:r>
-              <a:rPr lang="de-DE" dirty="0" smtClean="0"/>
-              <a:t>Bei direkten Transformationen</a:t>
-            </a:r>
-          </a:p>
-          <a:p>
-            <a:pPr lvl="1"/>
-            <a:r>
-              <a:rPr lang="de-DE" dirty="0" smtClean="0"/>
-              <a:t>Syntax-abhängig</a:t>
-            </a:r>
-          </a:p>
-          <a:p>
-            <a:pPr lvl="1"/>
-            <a:r>
-              <a:rPr lang="de-DE" dirty="0" smtClean="0"/>
-              <a:t>Syntax-unabhängig</a:t>
-            </a:r>
-          </a:p>
-          <a:p>
-            <a:r>
-              <a:rPr lang="de-DE" dirty="0" smtClean="0"/>
-              <a:t>Bei indirekte Transformationen</a:t>
-            </a:r>
-          </a:p>
-          <a:p>
-            <a:pPr lvl="1"/>
-            <a:r>
-              <a:rPr lang="de-DE" dirty="0" smtClean="0"/>
-              <a:t>Fixes Schema für das Zwischenformat</a:t>
-            </a:r>
-          </a:p>
-          <a:p>
-            <a:pPr lvl="1"/>
-            <a:r>
-              <a:rPr lang="de-DE" dirty="0" smtClean="0"/>
-              <a:t>Variables Schema für das Zwischenformat</a:t>
-            </a:r>
+            <a:pPr>
+              <a:buNone/>
+            </a:pPr>
+            <a:r>
+              <a:rPr lang="de-DE" dirty="0" smtClean="0"/>
+              <a:t>Direkte Überführung eines Modells in der Quellsprache A zu einem Modell in </a:t>
+            </a:r>
+            <a:r>
+              <a:rPr lang="de-DE" dirty="0" smtClean="0"/>
+              <a:t>der Zielsprache B, auf </a:t>
+            </a:r>
+            <a:r>
+              <a:rPr lang="de-DE" dirty="0" smtClean="0"/>
+              <a:t>Ebene der konkreten Syntax der jeweiligen Sprachen</a:t>
+            </a:r>
+          </a:p>
+          <a:p>
+            <a:r>
+              <a:rPr lang="de-DE" dirty="0" smtClean="0"/>
+              <a:t>Vorteil: Sehr nahe an den Sprachen</a:t>
+            </a:r>
+          </a:p>
+          <a:p>
+            <a:r>
+              <a:rPr lang="de-DE" dirty="0" smtClean="0"/>
+              <a:t>Nachteil: Aufwand steigt exponentiell in der Anzahl an Sprachen und Formate</a:t>
+            </a:r>
+            <a:endParaRPr lang="de-DE" dirty="0" smtClean="0"/>
+          </a:p>
+          <a:p>
+            <a:r>
+              <a:rPr lang="de-DE" dirty="0" smtClean="0"/>
+              <a:t>Beispiel: </a:t>
+            </a:r>
+            <a:r>
+              <a:rPr lang="de-DE" dirty="0" smtClean="0"/>
+              <a:t>XSLT</a:t>
+            </a:r>
+            <a:endParaRPr lang="de-DE" dirty="0" smtClean="0"/>
           </a:p>
         </p:txBody>
       </p:sp>
       <p:sp>
         <p:nvSpPr>
-          <p:cNvPr id="3" name="Titel 2"/>
+          <p:cNvPr id="3" name="Title 2"/>
           <p:cNvSpPr>
             <a:spLocks noGrp="1"/>
           </p:cNvSpPr>
@@ -8817,31 +9980,64 @@
             <p:ph type="title"/>
           </p:nvPr>
         </p:nvSpPr>
-        <p:spPr/>
+        <p:spPr>
+          <a:xfrm>
+            <a:off x="250825" y="195526"/>
+            <a:ext cx="8031163" cy="600164"/>
+          </a:xfrm>
+        </p:spPr>
         <p:txBody>
           <a:bodyPr/>
           <a:lstStyle/>
           <a:p>
             <a:r>
               <a:rPr lang="de-DE" dirty="0" smtClean="0"/>
-              <a:t>Lösungsmöglichkeiten</a:t>
-            </a:r>
-            <a:endParaRPr lang="de-DE" dirty="0"/>
+              <a:t>Transformationen (IDP 1) </a:t>
+            </a:r>
+            <a:r>
+              <a:rPr lang="de-DE" dirty="0" smtClean="0"/>
+              <a:t>– Lösungsmöglichkeit 1</a:t>
+            </a:r>
+            <a:br>
+              <a:rPr lang="de-DE" dirty="0" smtClean="0"/>
+            </a:br>
+            <a:r>
+              <a:rPr lang="de-DE" sz="1400" dirty="0" smtClean="0"/>
+              <a:t>Direkte </a:t>
+            </a:r>
+            <a:r>
+              <a:rPr lang="de-DE" sz="1400" dirty="0" smtClean="0"/>
+              <a:t>syntax-abhängigte Transformation </a:t>
+            </a:r>
+            <a:endParaRPr lang="bg-BG" sz="1400" dirty="0"/>
           </a:p>
         </p:txBody>
       </p:sp>
+      <p:graphicFrame>
+        <p:nvGraphicFramePr>
+          <p:cNvPr id="4102" name="Object 6"/>
+          <p:cNvGraphicFramePr>
+            <a:graphicFrameLocks noChangeAspect="1"/>
+          </p:cNvGraphicFramePr>
+          <p:nvPr/>
+        </p:nvGraphicFramePr>
+        <p:xfrm>
+          <a:off x="785813" y="2786058"/>
+          <a:ext cx="7496175" cy="3209925"/>
+        </p:xfrm>
+        <a:graphic>
+          <a:graphicData uri="http://schemas.openxmlformats.org/presentationml/2006/ole">
+            <p:oleObj spid="_x0000_s4102" name="Visio" r:id="rId3" imgW="7496114" imgH="3209861" progId="Visio.Drawing.15">
+              <p:embed/>
+            </p:oleObj>
+          </a:graphicData>
+        </a:graphic>
+      </p:graphicFrame>
     </p:spTree>
   </p:cSld>
   <p:clrMapOvr>
     <a:masterClrMapping/>
   </p:clrMapOvr>
-  <p:timing>
-    <p:tnLst>
-      <p:par>
-        <p:cTn id="1" dur="indefinite" restart="never" nodeType="tmRoot"/>
-      </p:par>
-    </p:tnLst>
-  </p:timing>
 </p:sld>
 </file>
 

</xml_diff>